<commit_message>
update python-meetup 20200719 ppt
</commit_message>
<xml_diff>
--- a/Python-Meetup/20200719/面向一小部分程序员的数学学习相关话题简言.pptx
+++ b/Python-Meetup/20200719/面向一小部分程序员的数学学习相关话题简言.pptx
@@ -10738,7 +10738,7 @@
             </a:pPr>
             <a:r>
               <a:rPr lang="zh-CN" altLang="en-US" sz="3200" kern="1200" dirty="0"/>
-              <a:t>域间关系</a:t>
+              <a:t>域间共性</a:t>
             </a:r>
           </a:p>
         </p:txBody>
@@ -10871,7 +10871,7 @@
         <p:spPr>
           <a:xfrm>
             <a:off x="8369373" y="3565137"/>
-            <a:ext cx="2031325" cy="276999"/>
+            <a:ext cx="2185214" cy="276999"/>
           </a:xfrm>
           <a:prstGeom prst="rect">
             <a:avLst/>
@@ -10886,7 +10886,7 @@
           <a:p>
             <a:r>
               <a:rPr lang="zh-CN" altLang="en-US" sz="1200" dirty="0"/>
-              <a:t>对不同系统进行同性质抽象</a:t>
+              <a:t>对不同系统进行概念共性抽象</a:t>
             </a:r>
           </a:p>
         </p:txBody>
@@ -11351,8 +11351,8 @@
           </a:p>
         </p:txBody>
       </p:sp>
-      <mc:AlternateContent xmlns:mc="http://schemas.openxmlformats.org/markup-compatibility/2006">
-        <mc:Choice xmlns:a14="http://schemas.microsoft.com/office/drawing/2010/main" Requires="a14">
+      <mc:AlternateContent xmlns:mc="http://schemas.openxmlformats.org/markup-compatibility/2006" xmlns:a14="http://schemas.microsoft.com/office/drawing/2010/main">
+        <mc:Choice Requires="a14">
           <p:sp>
             <p:nvSpPr>
               <p:cNvPr id="6" name="内容占位符 3">
@@ -11902,7 +11902,7 @@
             </p:txBody>
           </p:sp>
         </mc:Choice>
-        <mc:Fallback>
+        <mc:Fallback xmlns="">
           <p:sp>
             <p:nvSpPr>
               <p:cNvPr id="6" name="内容占位符 3">
@@ -11952,8 +11952,8 @@
           </p:sp>
         </mc:Fallback>
       </mc:AlternateContent>
-      <mc:AlternateContent xmlns:mc="http://schemas.openxmlformats.org/markup-compatibility/2006">
-        <mc:Choice xmlns:a14="http://schemas.microsoft.com/office/drawing/2010/main" Requires="a14">
+      <mc:AlternateContent xmlns:mc="http://schemas.openxmlformats.org/markup-compatibility/2006" xmlns:a14="http://schemas.microsoft.com/office/drawing/2010/main">
+        <mc:Choice Requires="a14">
           <p:sp>
             <p:nvSpPr>
               <p:cNvPr id="7" name="内容占位符 3">
@@ -14096,7 +14096,7 @@
             </p:txBody>
           </p:sp>
         </mc:Choice>
-        <mc:Fallback>
+        <mc:Fallback xmlns="">
           <p:sp>
             <p:nvSpPr>
               <p:cNvPr id="7" name="内容占位符 3">
@@ -14349,7 +14349,7 @@
                   <a:schemeClr val="accent2"/>
                 </a:solidFill>
               </a:rPr>
-              <a:t>域间关系 → </a:t>
+              <a:t>域间共性 → </a:t>
             </a:r>
             <a:r>
               <a:rPr lang="en-US" altLang="zh-CN" sz="1400" b="1" dirty="0">
@@ -14364,7 +14364,7 @@
             <a:pPr lvl="1"/>
             <a:r>
               <a:rPr lang="zh-CN" altLang="en-US" sz="1400" dirty="0"/>
-              <a:t>傅里叶变换 和 最小二乘逼近 的关系是什么？（分析数学→线性代数的跨域）</a:t>
+              <a:t>傅里叶变换 和 最小二乘逼近 的关系是什么？（分析数学→线性代数的跨域 衍生 泛函）</a:t>
             </a:r>
           </a:p>
         </p:txBody>
@@ -15107,8 +15107,8 @@
           </a:p>
         </p:txBody>
       </p:sp>
-      <mc:AlternateContent xmlns:mc="http://schemas.openxmlformats.org/markup-compatibility/2006">
-        <mc:Choice xmlns:a14="http://schemas.microsoft.com/office/drawing/2010/main" Requires="a14">
+      <mc:AlternateContent xmlns:mc="http://schemas.openxmlformats.org/markup-compatibility/2006" xmlns:a14="http://schemas.microsoft.com/office/drawing/2010/main">
+        <mc:Choice Requires="a14">
           <p:sp>
             <p:nvSpPr>
               <p:cNvPr id="5" name="内容占位符 3">
@@ -16713,7 +16713,7 @@
             </p:txBody>
           </p:sp>
         </mc:Choice>
-        <mc:Fallback>
+        <mc:Fallback xmlns="">
           <p:sp>
             <p:nvSpPr>
               <p:cNvPr id="5" name="内容占位符 3">
@@ -16758,8 +16758,8 @@
           </p:sp>
         </mc:Fallback>
       </mc:AlternateContent>
-      <mc:AlternateContent xmlns:mc="http://schemas.openxmlformats.org/markup-compatibility/2006">
-        <mc:Choice xmlns:a14="http://schemas.microsoft.com/office/drawing/2010/main" Requires="a14">
+      <mc:AlternateContent xmlns:mc="http://schemas.openxmlformats.org/markup-compatibility/2006" xmlns:a14="http://schemas.microsoft.com/office/drawing/2010/main">
+        <mc:Choice Requires="a14">
           <p:sp>
             <p:nvSpPr>
               <p:cNvPr id="6" name="内容占位符 3">
@@ -18190,7 +18190,7 @@
             </p:txBody>
           </p:sp>
         </mc:Choice>
-        <mc:Fallback>
+        <mc:Fallback xmlns="">
           <p:sp>
             <p:nvSpPr>
               <p:cNvPr id="6" name="内容占位符 3">
@@ -18235,8 +18235,8 @@
           </p:sp>
         </mc:Fallback>
       </mc:AlternateContent>
-      <mc:AlternateContent xmlns:mc="http://schemas.openxmlformats.org/markup-compatibility/2006">
-        <mc:Choice xmlns:a14="http://schemas.microsoft.com/office/drawing/2010/main" Requires="a14">
+      <mc:AlternateContent xmlns:mc="http://schemas.openxmlformats.org/markup-compatibility/2006" xmlns:a14="http://schemas.microsoft.com/office/drawing/2010/main">
+        <mc:Choice Requires="a14">
           <p:sp>
             <p:nvSpPr>
               <p:cNvPr id="7" name="内容占位符 3">
@@ -18612,7 +18612,7 @@
             </p:txBody>
           </p:sp>
         </mc:Choice>
-        <mc:Fallback>
+        <mc:Fallback xmlns="">
           <p:sp>
             <p:nvSpPr>
               <p:cNvPr id="7" name="内容占位符 3">
@@ -19078,8 +19078,8 @@
           </a:p>
         </p:txBody>
       </p:sp>
-      <mc:AlternateContent xmlns:mc="http://schemas.openxmlformats.org/markup-compatibility/2006">
-        <mc:Choice xmlns:a14="http://schemas.microsoft.com/office/drawing/2010/main" Requires="a14">
+      <mc:AlternateContent xmlns:mc="http://schemas.openxmlformats.org/markup-compatibility/2006" xmlns:a14="http://schemas.microsoft.com/office/drawing/2010/main">
+        <mc:Choice Requires="a14">
           <p:sp>
             <p:nvSpPr>
               <p:cNvPr id="3" name="内容占位符 3">
@@ -19392,7 +19392,7 @@
                       <a:rPr lang="en-US" altLang="zh-CN" sz="1400" i="1" smtClean="0">
                         <a:latin typeface="Cambria Math" panose="02040503050406030204" pitchFamily="18" charset="0"/>
                       </a:rPr>
-                      <m:t>-</m:t>
+                      <m:t>−</m:t>
                     </m:r>
                     <m:r>
                       <a:rPr lang="en-US" altLang="zh-CN" sz="1400" i="1">
@@ -19573,7 +19573,7 @@
             </p:txBody>
           </p:sp>
         </mc:Choice>
-        <mc:Fallback>
+        <mc:Fallback xmlns="">
           <p:sp>
             <p:nvSpPr>
               <p:cNvPr id="3" name="内容占位符 3">
@@ -19617,8 +19617,8 @@
           </p:sp>
         </mc:Fallback>
       </mc:AlternateContent>
-      <mc:AlternateContent xmlns:mc="http://schemas.openxmlformats.org/markup-compatibility/2006">
-        <mc:Choice xmlns:a14="http://schemas.microsoft.com/office/drawing/2010/main" Requires="a14">
+      <mc:AlternateContent xmlns:mc="http://schemas.openxmlformats.org/markup-compatibility/2006" xmlns:a14="http://schemas.microsoft.com/office/drawing/2010/main">
+        <mc:Choice Requires="a14">
           <p:sp>
             <p:nvSpPr>
               <p:cNvPr id="11" name="内容占位符 3">
@@ -19926,7 +19926,7 @@
             </p:txBody>
           </p:sp>
         </mc:Choice>
-        <mc:Fallback>
+        <mc:Fallback xmlns="">
           <p:sp>
             <p:nvSpPr>
               <p:cNvPr id="11" name="内容占位符 3">
@@ -19971,8 +19971,8 @@
           </p:sp>
         </mc:Fallback>
       </mc:AlternateContent>
-      <mc:AlternateContent xmlns:mc="http://schemas.openxmlformats.org/markup-compatibility/2006">
-        <mc:Choice xmlns:a14="http://schemas.microsoft.com/office/drawing/2010/main" Requires="a14">
+      <mc:AlternateContent xmlns:mc="http://schemas.openxmlformats.org/markup-compatibility/2006" xmlns:a14="http://schemas.microsoft.com/office/drawing/2010/main">
+        <mc:Choice Requires="a14">
           <p:sp>
             <p:nvSpPr>
               <p:cNvPr id="12" name="文本框 11">
@@ -20046,7 +20046,7 @@
             </p:txBody>
           </p:sp>
         </mc:Choice>
-        <mc:Fallback>
+        <mc:Fallback xmlns="">
           <p:sp>
             <p:nvSpPr>
               <p:cNvPr id="12" name="文本框 11">
@@ -23445,8 +23445,8 @@
           </p:sp>
         </mc:Fallback>
       </mc:AlternateContent>
-      <mc:AlternateContent xmlns:mc="http://schemas.openxmlformats.org/markup-compatibility/2006">
-        <mc:Choice xmlns:a14="http://schemas.microsoft.com/office/drawing/2010/main" Requires="a14">
+      <mc:AlternateContent xmlns:mc="http://schemas.openxmlformats.org/markup-compatibility/2006" xmlns:a14="http://schemas.microsoft.com/office/drawing/2010/main">
+        <mc:Choice Requires="a14">
           <p:sp>
             <p:nvSpPr>
               <p:cNvPr id="8" name="文本框 7">
@@ -24056,7 +24056,7 @@
             </p:txBody>
           </p:sp>
         </mc:Choice>
-        <mc:Fallback>
+        <mc:Fallback xmlns="">
           <p:sp>
             <p:nvSpPr>
               <p:cNvPr id="8" name="文本框 7">

</xml_diff>

<commit_message>
finish python-meetup 20200719 ppt
</commit_message>
<xml_diff>
--- a/Python-Meetup/20200719/面向一小部分程序员的数学学习相关话题简言.pptx
+++ b/Python-Meetup/20200719/面向一小部分程序员的数学学习相关话题简言.pptx
@@ -5,10 +5,10 @@
     <p:sldMasterId id="2147483648" r:id="rId1"/>
   </p:sldMasterIdLst>
   <p:notesMasterIdLst>
-    <p:notesMasterId r:id="rId20"/>
+    <p:notesMasterId r:id="rId23"/>
   </p:notesMasterIdLst>
   <p:handoutMasterIdLst>
-    <p:handoutMasterId r:id="rId21"/>
+    <p:handoutMasterId r:id="rId24"/>
   </p:handoutMasterIdLst>
   <p:sldIdLst>
     <p:sldId id="256" r:id="rId2"/>
@@ -28,7 +28,10 @@
     <p:sldId id="288" r:id="rId16"/>
     <p:sldId id="287" r:id="rId17"/>
     <p:sldId id="289" r:id="rId18"/>
-    <p:sldId id="290" r:id="rId19"/>
+    <p:sldId id="292" r:id="rId19"/>
+    <p:sldId id="291" r:id="rId20"/>
+    <p:sldId id="293" r:id="rId21"/>
+    <p:sldId id="290" r:id="rId22"/>
   </p:sldIdLst>
   <p:sldSz cx="12188825" cy="6858000"/>
   <p:notesSz cx="6858000" cy="9144000"/>
@@ -255,7 +258,7 @@
                 <a:latin typeface="微软雅黑" panose="020B0503020204020204" pitchFamily="34" charset="-122"/>
                 <a:ea typeface="微软雅黑" panose="020B0503020204020204" pitchFamily="34" charset="-122"/>
               </a:rPr>
-              <a:t>2020年7月9日</a:t>
+              <a:t>2020年7月10日</a:t>
             </a:fld>
             <a:endParaRPr lang="zh-CN" altLang="en-US" dirty="0">
               <a:latin typeface="微软雅黑" panose="020B0503020204020204" pitchFamily="34" charset="-122"/>
@@ -447,7 +450,7 @@
             <a:fld id="{07D6BDDC-F39A-4E16-93D6-E40B88AA6D58}" type="datetime2">
               <a:rPr lang="zh-CN" altLang="en-US" smtClean="0"/>
               <a:pPr/>
-              <a:t>2020年7月9日</a:t>
+              <a:t>2020年7月10日</a:t>
             </a:fld>
             <a:endParaRPr lang="zh-CN" altLang="en-US" dirty="0"/>
           </a:p>
@@ -2387,7 +2390,7 @@
             <a:fld id="{4947C3F0-2957-4D41-9FB7-182757A04D67}" type="datetime2">
               <a:rPr lang="zh-CN" altLang="en-US" smtClean="0"/>
               <a:pPr/>
-              <a:t>2020年7月9日</a:t>
+              <a:t>2020年7月10日</a:t>
             </a:fld>
             <a:endParaRPr lang="zh-CN" altLang="en-US" dirty="0"/>
           </a:p>
@@ -2620,7 +2623,7 @@
             <a:fld id="{8DF8E148-EC1F-43A2-8C9E-1F57F6D08A76}" type="datetime2">
               <a:rPr lang="zh-CN" altLang="en-US" smtClean="0"/>
               <a:pPr/>
-              <a:t>2020年7月9日</a:t>
+              <a:t>2020年7月10日</a:t>
             </a:fld>
             <a:endParaRPr lang="zh-CN" altLang="en-US" dirty="0"/>
           </a:p>
@@ -3502,7 +3505,7 @@
             <a:fld id="{FB7B4C11-1E14-4887-9E78-A9346EC068F1}" type="datetime2">
               <a:rPr lang="zh-CN" altLang="en-US" smtClean="0"/>
               <a:pPr/>
-              <a:t>2020年7月9日</a:t>
+              <a:t>2020年7月10日</a:t>
             </a:fld>
             <a:endParaRPr lang="zh-CN" altLang="en-US" dirty="0"/>
           </a:p>
@@ -3761,7 +3764,7 @@
             <a:fld id="{86FD5D46-E987-42B2-B42C-B8920598FADE}" type="datetime2">
               <a:rPr lang="zh-CN" altLang="en-US" smtClean="0"/>
               <a:pPr/>
-              <a:t>2020年7月9日</a:t>
+              <a:t>2020年7月10日</a:t>
             </a:fld>
             <a:endParaRPr lang="zh-CN" altLang="en-US" dirty="0"/>
           </a:p>
@@ -5087,7 +5090,7 @@
             <a:fld id="{8365F240-A7EF-41C8-A85B-C448CF84B5E5}" type="datetime2">
               <a:rPr lang="zh-CN" altLang="en-US" smtClean="0"/>
               <a:pPr/>
-              <a:t>2020年7月9日</a:t>
+              <a:t>2020年7月10日</a:t>
             </a:fld>
             <a:endParaRPr lang="zh-CN" altLang="en-US" dirty="0"/>
           </a:p>
@@ -5422,7 +5425,7 @@
             <a:fld id="{F770B30E-8728-44DB-AEE3-E4A75AEDBBD9}" type="datetime2">
               <a:rPr lang="zh-CN" altLang="en-US" smtClean="0"/>
               <a:pPr/>
-              <a:t>2020年7月9日</a:t>
+              <a:t>2020年7月10日</a:t>
             </a:fld>
             <a:endParaRPr lang="zh-CN" altLang="en-US" dirty="0"/>
           </a:p>
@@ -5923,7 +5926,7 @@
             <a:fld id="{680BCF82-A51A-4389-A573-378AD02C5141}" type="datetime2">
               <a:rPr lang="zh-CN" altLang="en-US" smtClean="0"/>
               <a:pPr/>
-              <a:t>2020年7月9日</a:t>
+              <a:t>2020年7月10日</a:t>
             </a:fld>
             <a:endParaRPr lang="zh-CN" altLang="en-US" dirty="0"/>
           </a:p>
@@ -6078,7 +6081,7 @@
             <a:fld id="{CE03A716-E3DC-4D9D-823C-60FCD8C9B163}" type="datetime2">
               <a:rPr lang="zh-CN" altLang="en-US" smtClean="0"/>
               <a:pPr/>
-              <a:t>2020年7月9日</a:t>
+              <a:t>2020年7月10日</a:t>
             </a:fld>
             <a:endParaRPr lang="zh-CN" altLang="en-US" dirty="0"/>
           </a:p>
@@ -6438,7 +6441,7 @@
             <a:fld id="{C16B8A94-44E5-4844-A22C-F796FCAA90D9}" type="datetime2">
               <a:rPr lang="zh-CN" altLang="en-US" smtClean="0"/>
               <a:pPr/>
-              <a:t>2020年7月9日</a:t>
+              <a:t>2020年7月10日</a:t>
             </a:fld>
             <a:endParaRPr lang="zh-CN" altLang="en-US" dirty="0"/>
           </a:p>
@@ -6980,7 +6983,7 @@
             <a:fld id="{F288B2AC-AC0A-4E49-82A3-94EE74FA7FBF}" type="datetime2">
               <a:rPr lang="zh-CN" altLang="en-US" smtClean="0"/>
               <a:pPr/>
-              <a:t>2020年7月9日</a:t>
+              <a:t>2020年7月10日</a:t>
             </a:fld>
             <a:endParaRPr lang="zh-CN" altLang="en-US" dirty="0"/>
           </a:p>
@@ -7466,7 +7469,7 @@
             <a:fld id="{1878E339-1BD2-4FEE-A113-9A0301740CF6}" type="datetime2">
               <a:rPr lang="zh-CN" altLang="en-US" smtClean="0"/>
               <a:pPr/>
-              <a:t>2020年7月9日</a:t>
+              <a:t>2020年7月10日</a:t>
             </a:fld>
             <a:endParaRPr lang="zh-CN" altLang="en-US" dirty="0"/>
           </a:p>
@@ -8389,7 +8392,7 @@
             <a:fld id="{A339CB27-C670-4AAB-948C-7E3D1D9FAE30}" type="datetime2">
               <a:rPr lang="zh-CN" altLang="en-US" smtClean="0"/>
               <a:pPr/>
-              <a:t>2020年7月9日</a:t>
+              <a:t>2020年7月10日</a:t>
             </a:fld>
             <a:endParaRPr lang="zh-CN" altLang="en-US" dirty="0"/>
           </a:p>
@@ -11100,8 +11103,8 @@
           </a:p>
         </p:txBody>
       </p:sp>
-      <mc:AlternateContent xmlns:mc="http://schemas.openxmlformats.org/markup-compatibility/2006">
-        <mc:Choice xmlns:a14="http://schemas.microsoft.com/office/drawing/2010/main" Requires="a14">
+      <mc:AlternateContent xmlns:mc="http://schemas.openxmlformats.org/markup-compatibility/2006" xmlns:a14="http://schemas.microsoft.com/office/drawing/2010/main">
+        <mc:Choice Requires="a14">
           <p:sp>
             <p:nvSpPr>
               <p:cNvPr id="6" name="内容占位符 3">
@@ -11648,7 +11651,7 @@
             </p:txBody>
           </p:sp>
         </mc:Choice>
-        <mc:Fallback>
+        <mc:Fallback xmlns="">
           <p:sp>
             <p:nvSpPr>
               <p:cNvPr id="6" name="内容占位符 3">
@@ -11698,8 +11701,8 @@
           </p:sp>
         </mc:Fallback>
       </mc:AlternateContent>
-      <mc:AlternateContent xmlns:mc="http://schemas.openxmlformats.org/markup-compatibility/2006">
-        <mc:Choice xmlns:a14="http://schemas.microsoft.com/office/drawing/2010/main" Requires="a14">
+      <mc:AlternateContent xmlns:mc="http://schemas.openxmlformats.org/markup-compatibility/2006" xmlns:a14="http://schemas.microsoft.com/office/drawing/2010/main">
+        <mc:Choice Requires="a14">
           <p:sp>
             <p:nvSpPr>
               <p:cNvPr id="7" name="内容占位符 3">
@@ -13839,7 +13842,7 @@
             </p:txBody>
           </p:sp>
         </mc:Choice>
-        <mc:Fallback>
+        <mc:Fallback xmlns="">
           <p:sp>
             <p:nvSpPr>
               <p:cNvPr id="7" name="内容占位符 3">
@@ -14567,7 +14570,7 @@
                                         <p:tgtEl>
                                           <p:spTgt spid="7">
                                             <p:txEl>
-                                              <p:charRg st="147" end="303"/>
+                                              <p:pRg st="2" end="2"/>
                                             </p:txEl>
                                           </p:spTgt>
                                         </p:tgtEl>
@@ -14594,7 +14597,7 @@
                                         <p:tgtEl>
                                           <p:spTgt spid="7">
                                             <p:txEl>
-                                              <p:charRg st="303" end="453"/>
+                                              <p:pRg st="3" end="3"/>
                                             </p:txEl>
                                           </p:spTgt>
                                         </p:tgtEl>
@@ -14621,7 +14624,7 @@
                                         <p:tgtEl>
                                           <p:spTgt spid="7">
                                             <p:txEl>
-                                              <p:charRg st="453" end="556"/>
+                                              <p:pRg st="4" end="4"/>
                                             </p:txEl>
                                           </p:spTgt>
                                         </p:tgtEl>
@@ -14939,7 +14942,7 @@
                                         <p:tgtEl>
                                           <p:spTgt spid="7">
                                             <p:txEl>
-                                              <p:charRg st="147" end="303"/>
+                                              <p:pRg st="2" end="2"/>
                                             </p:txEl>
                                           </p:spTgt>
                                         </p:tgtEl>
@@ -14966,7 +14969,7 @@
                                         <p:tgtEl>
                                           <p:spTgt spid="7">
                                             <p:txEl>
-                                              <p:charRg st="303" end="453"/>
+                                              <p:pRg st="3" end="3"/>
                                             </p:txEl>
                                           </p:spTgt>
                                         </p:tgtEl>
@@ -14993,7 +14996,7 @@
                                         <p:tgtEl>
                                           <p:spTgt spid="7">
                                             <p:txEl>
-                                              <p:charRg st="453" end="556"/>
+                                              <p:pRg st="4" end="4"/>
                                             </p:txEl>
                                           </p:spTgt>
                                         </p:tgtEl>
@@ -15273,8 +15276,8 @@
           </a:p>
         </p:txBody>
       </p:sp>
-      <mc:AlternateContent xmlns:mc="http://schemas.openxmlformats.org/markup-compatibility/2006">
-        <mc:Choice xmlns:a14="http://schemas.microsoft.com/office/drawing/2010/main" Requires="a14">
+      <mc:AlternateContent xmlns:mc="http://schemas.openxmlformats.org/markup-compatibility/2006" xmlns:a14="http://schemas.microsoft.com/office/drawing/2010/main">
+        <mc:Choice Requires="a14">
           <p:sp>
             <p:nvSpPr>
               <p:cNvPr id="5" name="内容占位符 3">
@@ -16871,7 +16874,7 @@
             </p:txBody>
           </p:sp>
         </mc:Choice>
-        <mc:Fallback>
+        <mc:Fallback xmlns="">
           <p:sp>
             <p:nvSpPr>
               <p:cNvPr id="5" name="内容占位符 3">
@@ -16916,8 +16919,8 @@
           </p:sp>
         </mc:Fallback>
       </mc:AlternateContent>
-      <mc:AlternateContent xmlns:mc="http://schemas.openxmlformats.org/markup-compatibility/2006">
-        <mc:Choice xmlns:a14="http://schemas.microsoft.com/office/drawing/2010/main" Requires="a14">
+      <mc:AlternateContent xmlns:mc="http://schemas.openxmlformats.org/markup-compatibility/2006" xmlns:a14="http://schemas.microsoft.com/office/drawing/2010/main">
+        <mc:Choice Requires="a14">
           <p:sp>
             <p:nvSpPr>
               <p:cNvPr id="6" name="内容占位符 3">
@@ -18340,7 +18343,7 @@
             </p:txBody>
           </p:sp>
         </mc:Choice>
-        <mc:Fallback>
+        <mc:Fallback xmlns="">
           <p:sp>
             <p:nvSpPr>
               <p:cNvPr id="6" name="内容占位符 3">
@@ -18385,8 +18388,8 @@
           </p:sp>
         </mc:Fallback>
       </mc:AlternateContent>
-      <mc:AlternateContent xmlns:mc="http://schemas.openxmlformats.org/markup-compatibility/2006">
-        <mc:Choice xmlns:a14="http://schemas.microsoft.com/office/drawing/2010/main" Requires="a14">
+      <mc:AlternateContent xmlns:mc="http://schemas.openxmlformats.org/markup-compatibility/2006" xmlns:a14="http://schemas.microsoft.com/office/drawing/2010/main">
+        <mc:Choice Requires="a14">
           <p:sp>
             <p:nvSpPr>
               <p:cNvPr id="7" name="内容占位符 3">
@@ -18754,7 +18757,7 @@
             </p:txBody>
           </p:sp>
         </mc:Choice>
-        <mc:Fallback>
+        <mc:Fallback xmlns="">
           <p:sp>
             <p:nvSpPr>
               <p:cNvPr id="7" name="内容占位符 3">
@@ -19220,8 +19223,8 @@
           </a:p>
         </p:txBody>
       </p:sp>
-      <mc:AlternateContent xmlns:mc="http://schemas.openxmlformats.org/markup-compatibility/2006">
-        <mc:Choice xmlns:a14="http://schemas.microsoft.com/office/drawing/2010/main" Requires="a14">
+      <mc:AlternateContent xmlns:mc="http://schemas.openxmlformats.org/markup-compatibility/2006" xmlns:a14="http://schemas.microsoft.com/office/drawing/2010/main">
+        <mc:Choice Requires="a14">
           <p:sp>
             <p:nvSpPr>
               <p:cNvPr id="3" name="内容占位符 3">
@@ -19519,7 +19522,7 @@
             </p:txBody>
           </p:sp>
         </mc:Choice>
-        <mc:Fallback>
+        <mc:Fallback xmlns="">
           <p:sp>
             <p:nvSpPr>
               <p:cNvPr id="3" name="内容占位符 3">
@@ -19563,8 +19566,8 @@
           </p:sp>
         </mc:Fallback>
       </mc:AlternateContent>
-      <mc:AlternateContent xmlns:mc="http://schemas.openxmlformats.org/markup-compatibility/2006">
-        <mc:Choice xmlns:a14="http://schemas.microsoft.com/office/drawing/2010/main" Requires="a14">
+      <mc:AlternateContent xmlns:mc="http://schemas.openxmlformats.org/markup-compatibility/2006" xmlns:a14="http://schemas.microsoft.com/office/drawing/2010/main">
+        <mc:Choice Requires="a14">
           <p:sp>
             <p:nvSpPr>
               <p:cNvPr id="11" name="内容占位符 3">
@@ -19852,7 +19855,7 @@
             </p:txBody>
           </p:sp>
         </mc:Choice>
-        <mc:Fallback>
+        <mc:Fallback xmlns="">
           <p:sp>
             <p:nvSpPr>
               <p:cNvPr id="11" name="内容占位符 3">
@@ -19897,8 +19900,8 @@
           </p:sp>
         </mc:Fallback>
       </mc:AlternateContent>
-      <mc:AlternateContent xmlns:mc="http://schemas.openxmlformats.org/markup-compatibility/2006">
-        <mc:Choice xmlns:a14="http://schemas.microsoft.com/office/drawing/2010/main" Requires="a14">
+      <mc:AlternateContent xmlns:mc="http://schemas.openxmlformats.org/markup-compatibility/2006" xmlns:a14="http://schemas.microsoft.com/office/drawing/2010/main">
+        <mc:Choice Requires="a14">
           <p:sp>
             <p:nvSpPr>
               <p:cNvPr id="12" name="文本框 11">
@@ -19927,6 +19930,7 @@
               </a:bodyPr>
               <a:lstStyle/>
               <a:p>
+                <a:pPr/>
                 <a14:m>
                   <m:oMathPara xmlns:m="http://schemas.openxmlformats.org/officeDocument/2006/math">
                     <m:oMathParaPr>
@@ -19971,7 +19975,7 @@
             </p:txBody>
           </p:sp>
         </mc:Choice>
-        <mc:Fallback>
+        <mc:Fallback xmlns="">
           <p:sp>
             <p:nvSpPr>
               <p:cNvPr id="12" name="文本框 11">
@@ -20506,13 +20510,13 @@
   <p:clrMapOvr>
     <a:masterClrMapping/>
   </p:clrMapOvr>
-  <mc:AlternateContent xmlns:mc="http://schemas.openxmlformats.org/markup-compatibility/2006">
-    <mc:Choice xmlns:p14="http://schemas.microsoft.com/office/powerpoint/2010/main" Requires="p14">
+  <mc:AlternateContent xmlns:mc="http://schemas.openxmlformats.org/markup-compatibility/2006" xmlns:p14="http://schemas.microsoft.com/office/powerpoint/2010/main">
+    <mc:Choice Requires="p14">
       <p:transition spd="med" p14:dur="700">
         <p:fade/>
       </p:transition>
     </mc:Choice>
-    <mc:Fallback>
+    <mc:Fallback xmlns="">
       <p:transition spd="med">
         <p:fade/>
       </p:transition>
@@ -21231,13 +21235,13 @@
   <p:clrMapOvr>
     <a:masterClrMapping/>
   </p:clrMapOvr>
-  <mc:AlternateContent xmlns:mc="http://schemas.openxmlformats.org/markup-compatibility/2006">
-    <mc:Choice xmlns:p14="http://schemas.microsoft.com/office/powerpoint/2010/main" Requires="p14">
+  <mc:AlternateContent xmlns:mc="http://schemas.openxmlformats.org/markup-compatibility/2006" xmlns:p14="http://schemas.microsoft.com/office/powerpoint/2010/main">
+    <mc:Choice Requires="p14">
       <p:transition spd="med" p14:dur="700">
         <p:fade/>
       </p:transition>
     </mc:Choice>
-    <mc:Fallback>
+    <mc:Fallback xmlns="">
       <p:transition spd="med">
         <p:fade/>
       </p:transition>
@@ -21363,13 +21367,13 @@
   <p:clrMapOvr>
     <a:masterClrMapping/>
   </p:clrMapOvr>
-  <mc:AlternateContent xmlns:mc="http://schemas.openxmlformats.org/markup-compatibility/2006">
-    <mc:Choice xmlns:p14="http://schemas.microsoft.com/office/powerpoint/2010/main" Requires="p14">
+  <mc:AlternateContent xmlns:mc="http://schemas.openxmlformats.org/markup-compatibility/2006" xmlns:p14="http://schemas.microsoft.com/office/powerpoint/2010/main">
+    <mc:Choice Requires="p14">
       <p:transition spd="med" p14:dur="700">
         <p:fade/>
       </p:transition>
     </mc:Choice>
-    <mc:Fallback>
+    <mc:Fallback xmlns="">
       <p:transition spd="med">
         <p:fade/>
       </p:transition>
@@ -21400,412 +21404,1262 @@
           <p:cNvPr id="2" name="标题 1">
             <a:extLst>
               <a:ext uri="{FF2B5EF4-FFF2-40B4-BE49-F238E27FC236}">
-                <a16:creationId xmlns:a16="http://schemas.microsoft.com/office/drawing/2014/main" id="{25B1E346-61E0-45DA-9D10-CE11866FB2DE}"/>
+                <a16:creationId xmlns:a16="http://schemas.microsoft.com/office/drawing/2014/main" id="{F6FBF821-1EBB-4608-A353-34065F24C6C6}"/>
               </a:ext>
             </a:extLst>
           </p:cNvPr>
-          <p:cNvSpPr txBox="1">
-            <a:spLocks/>
+          <p:cNvSpPr>
+            <a:spLocks noGrp="1"/>
           </p:cNvSpPr>
+          <p:nvPr>
+            <p:ph type="title"/>
+          </p:nvPr>
+        </p:nvSpPr>
+        <p:spPr>
+          <a:xfrm>
+            <a:off x="1593436" y="177801"/>
+            <a:ext cx="9782801" cy="874936"/>
+          </a:xfrm>
+        </p:spPr>
+        <p:txBody>
+          <a:bodyPr/>
+          <a:lstStyle/>
+          <a:p>
+            <a:r>
+              <a:rPr lang="zh-CN" altLang="en-US" dirty="0">
+                <a:latin typeface="Arial" panose="020B0604020202020204" pitchFamily="34" charset="0"/>
+                <a:sym typeface="Arial" panose="020B0604020202020204" pitchFamily="34" charset="0"/>
+              </a:rPr>
+              <a:t>普通程序开发人员</a:t>
+            </a:r>
+            <a:endParaRPr lang="zh-CN" altLang="en-US" dirty="0"/>
+          </a:p>
+        </p:txBody>
+      </p:sp>
+      <p:sp>
+        <p:nvSpPr>
+          <p:cNvPr id="3" name="椭圆 2">
+            <a:extLst>
+              <a:ext uri="{FF2B5EF4-FFF2-40B4-BE49-F238E27FC236}">
+                <a16:creationId xmlns:a16="http://schemas.microsoft.com/office/drawing/2014/main" id="{43C367C7-C5E9-4A7F-AEF4-E4CC18CD08EE}"/>
+              </a:ext>
+            </a:extLst>
+          </p:cNvPr>
+          <p:cNvSpPr/>
           <p:nvPr/>
         </p:nvSpPr>
         <p:spPr>
           <a:xfrm>
-            <a:off x="1845940" y="1689968"/>
-            <a:ext cx="2196720" cy="874936"/>
+            <a:off x="5404716" y="2971800"/>
+            <a:ext cx="2160240" cy="914400"/>
           </a:xfrm>
-          <a:prstGeom prst="rect">
+          <a:prstGeom prst="ellipse">
             <a:avLst/>
           </a:prstGeom>
         </p:spPr>
+        <p:style>
+          <a:lnRef idx="2">
+            <a:schemeClr val="accent1">
+              <a:shade val="50000"/>
+            </a:schemeClr>
+          </a:lnRef>
+          <a:fillRef idx="1">
+            <a:schemeClr val="accent1"/>
+          </a:fillRef>
+          <a:effectRef idx="0">
+            <a:schemeClr val="accent1"/>
+          </a:effectRef>
+          <a:fontRef idx="minor">
+            <a:schemeClr val="lt1"/>
+          </a:fontRef>
+        </p:style>
         <p:txBody>
-          <a:bodyPr/>
-          <a:lstStyle>
-            <a:lvl1pPr algn="l" defTabSz="914400" rtl="0" eaLnBrk="1" latinLnBrk="0" hangingPunct="1">
-              <a:lnSpc>
-                <a:spcPct val="90000"/>
-              </a:lnSpc>
-              <a:spcBef>
-                <a:spcPct val="0"/>
-              </a:spcBef>
-              <a:buNone/>
-              <a:defRPr sz="3600" kern="1200">
-                <a:solidFill>
-                  <a:schemeClr val="tx1">
-                    <a:lumMod val="75000"/>
-                  </a:schemeClr>
-                </a:solidFill>
-                <a:latin typeface="微软雅黑" panose="020B0503020204020204" pitchFamily="34" charset="-122"/>
-                <a:ea typeface="微软雅黑" panose="020B0503020204020204" pitchFamily="34" charset="-122"/>
-                <a:cs typeface="+mj-cs"/>
-              </a:defRPr>
-            </a:lvl1pPr>
-          </a:lstStyle>
-          <a:p>
-            <a:r>
-              <a:rPr lang="en-US" altLang="zh-CN" dirty="0">
-                <a:latin typeface="Arial" panose="020B0604020202020204" pitchFamily="34" charset="0"/>
-                <a:sym typeface="Arial" panose="020B0604020202020204" pitchFamily="34" charset="0"/>
-              </a:rPr>
-              <a:t>Fin.</a:t>
-            </a:r>
-            <a:endParaRPr lang="zh-CN" altLang="en-US" dirty="0"/>
-          </a:p>
-        </p:txBody>
-      </p:sp>
-      <p:sp>
-        <p:nvSpPr>
-          <p:cNvPr id="3" name="文本框 2">
-            <a:extLst>
-              <a:ext uri="{FF2B5EF4-FFF2-40B4-BE49-F238E27FC236}">
-                <a16:creationId xmlns:a16="http://schemas.microsoft.com/office/drawing/2014/main" id="{D7C21974-A63E-4BD7-B67F-98FDC865CA86}"/>
-              </a:ext>
-            </a:extLst>
-          </p:cNvPr>
-          <p:cNvSpPr txBox="1"/>
-          <p:nvPr/>
-        </p:nvSpPr>
-        <p:spPr>
-          <a:xfrm>
-            <a:off x="1845940" y="2564904"/>
-            <a:ext cx="7879080" cy="707886"/>
-          </a:xfrm>
-          <a:prstGeom prst="rect">
-            <a:avLst/>
-          </a:prstGeom>
-          <a:noFill/>
-        </p:spPr>
-        <p:txBody>
-          <a:bodyPr wrap="none" rtlCol="0">
-            <a:spAutoFit/>
-          </a:bodyPr>
+          <a:bodyPr rtlCol="0" anchor="ctr"/>
           <a:lstStyle/>
           <a:p>
-            <a:r>
-              <a:rPr lang="zh-CN" altLang="en-US" sz="4000" dirty="0"/>
-              <a:t>感谢大家百忙之中抽出时间的聆听</a:t>
-            </a:r>
-          </a:p>
-        </p:txBody>
-      </p:sp>
-      <p:sp>
-        <p:nvSpPr>
-          <p:cNvPr id="4" name="副标题 2">
-            <a:extLst>
-              <a:ext uri="{FF2B5EF4-FFF2-40B4-BE49-F238E27FC236}">
-                <a16:creationId xmlns:a16="http://schemas.microsoft.com/office/drawing/2014/main" id="{F82D915E-E5F3-475A-982D-78A233008504}"/>
-              </a:ext>
-            </a:extLst>
-          </p:cNvPr>
-          <p:cNvSpPr txBox="1">
-            <a:spLocks/>
-          </p:cNvSpPr>
-          <p:nvPr/>
-        </p:nvSpPr>
-        <p:spPr>
-          <a:xfrm>
-            <a:off x="1845940" y="3933056"/>
-            <a:ext cx="8329031" cy="1527944"/>
-          </a:xfrm>
-          <a:prstGeom prst="rect">
-            <a:avLst/>
-          </a:prstGeom>
-        </p:spPr>
-        <p:txBody>
-          <a:bodyPr rtlCol="0">
-            <a:normAutofit lnSpcReduction="10000"/>
-          </a:bodyPr>
-          <a:lstStyle>
-            <a:lvl1pPr marL="246888" indent="-246888" algn="l" defTabSz="914400" rtl="0" eaLnBrk="1" latinLnBrk="0" hangingPunct="1">
-              <a:lnSpc>
-                <a:spcPct val="90000"/>
-              </a:lnSpc>
-              <a:spcBef>
-                <a:spcPts val="1400"/>
-              </a:spcBef>
-              <a:buFont typeface="Euphemia" pitchFamily="34" charset="0"/>
-              <a:buChar char="›"/>
-              <a:defRPr sz="2800" kern="1200">
-                <a:solidFill>
-                  <a:schemeClr val="tx1"/>
-                </a:solidFill>
-                <a:latin typeface="微软雅黑" panose="020B0503020204020204" pitchFamily="34" charset="-122"/>
-                <a:ea typeface="微软雅黑" panose="020B0503020204020204" pitchFamily="34" charset="-122"/>
-                <a:cs typeface="+mn-cs"/>
-              </a:defRPr>
-            </a:lvl1pPr>
-            <a:lvl2pPr marL="612648" indent="-246888" algn="l" defTabSz="914400" rtl="0" eaLnBrk="1" latinLnBrk="0" hangingPunct="1">
-              <a:lnSpc>
-                <a:spcPct val="90000"/>
-              </a:lnSpc>
-              <a:spcBef>
-                <a:spcPts val="600"/>
-              </a:spcBef>
-              <a:buFont typeface="Euphemia" pitchFamily="34" charset="0"/>
-              <a:buChar char="–"/>
-              <a:defRPr sz="2400" kern="1200">
-                <a:solidFill>
-                  <a:schemeClr val="tx1"/>
-                </a:solidFill>
-                <a:latin typeface="微软雅黑" panose="020B0503020204020204" pitchFamily="34" charset="-122"/>
-                <a:ea typeface="微软雅黑" panose="020B0503020204020204" pitchFamily="34" charset="-122"/>
-                <a:cs typeface="+mn-cs"/>
-              </a:defRPr>
-            </a:lvl2pPr>
-            <a:lvl3pPr marL="978408" indent="-246888" algn="l" defTabSz="914400" rtl="0" eaLnBrk="1" latinLnBrk="0" hangingPunct="1">
-              <a:lnSpc>
-                <a:spcPct val="90000"/>
-              </a:lnSpc>
-              <a:spcBef>
-                <a:spcPts val="600"/>
-              </a:spcBef>
-              <a:buFont typeface="Euphemia" pitchFamily="34" charset="0"/>
-              <a:buChar char="›"/>
-              <a:defRPr sz="2000" kern="1200">
-                <a:solidFill>
-                  <a:schemeClr val="tx1"/>
-                </a:solidFill>
-                <a:latin typeface="微软雅黑" panose="020B0503020204020204" pitchFamily="34" charset="-122"/>
-                <a:ea typeface="微软雅黑" panose="020B0503020204020204" pitchFamily="34" charset="-122"/>
-                <a:cs typeface="+mn-cs"/>
-              </a:defRPr>
-            </a:lvl3pPr>
-            <a:lvl4pPr marL="1344168" indent="-246888" algn="l" defTabSz="914400" rtl="0" eaLnBrk="1" latinLnBrk="0" hangingPunct="1">
-              <a:lnSpc>
-                <a:spcPct val="90000"/>
-              </a:lnSpc>
-              <a:spcBef>
-                <a:spcPts val="600"/>
-              </a:spcBef>
-              <a:buFont typeface="Arial" pitchFamily="34" charset="0"/>
-              <a:buChar char="–"/>
-              <a:defRPr sz="1800" kern="1200">
-                <a:solidFill>
-                  <a:schemeClr val="tx1"/>
-                </a:solidFill>
-                <a:latin typeface="微软雅黑" panose="020B0503020204020204" pitchFamily="34" charset="-122"/>
-                <a:ea typeface="微软雅黑" panose="020B0503020204020204" pitchFamily="34" charset="-122"/>
-                <a:cs typeface="+mn-cs"/>
-              </a:defRPr>
-            </a:lvl4pPr>
-            <a:lvl5pPr marL="1709928" indent="-246888" algn="l" defTabSz="914400" rtl="0" eaLnBrk="1" latinLnBrk="0" hangingPunct="1">
-              <a:lnSpc>
-                <a:spcPct val="90000"/>
-              </a:lnSpc>
-              <a:spcBef>
-                <a:spcPts val="600"/>
-              </a:spcBef>
-              <a:buFont typeface="Euphemia" pitchFamily="34" charset="0"/>
-              <a:buChar char="›"/>
-              <a:defRPr sz="1800" kern="1200">
-                <a:solidFill>
-                  <a:schemeClr val="tx1"/>
-                </a:solidFill>
-                <a:latin typeface="微软雅黑" panose="020B0503020204020204" pitchFamily="34" charset="-122"/>
-                <a:ea typeface="微软雅黑" panose="020B0503020204020204" pitchFamily="34" charset="-122"/>
-                <a:cs typeface="+mn-cs"/>
-              </a:defRPr>
-            </a:lvl5pPr>
-            <a:lvl6pPr marL="2075688" indent="-246888" algn="l" defTabSz="914400" rtl="0" eaLnBrk="1" latinLnBrk="0" hangingPunct="1">
-              <a:lnSpc>
-                <a:spcPct val="90000"/>
-              </a:lnSpc>
-              <a:spcBef>
-                <a:spcPts val="600"/>
-              </a:spcBef>
-              <a:buFont typeface="Euphemia" pitchFamily="34" charset="0"/>
-              <a:buChar char="–"/>
-              <a:defRPr sz="1800" kern="1200">
-                <a:solidFill>
-                  <a:schemeClr val="tx1"/>
-                </a:solidFill>
-                <a:latin typeface="+mn-lt"/>
-                <a:ea typeface="+mn-ea"/>
-                <a:cs typeface="+mn-cs"/>
-              </a:defRPr>
-            </a:lvl6pPr>
-            <a:lvl7pPr marL="2441448" indent="-246888" algn="l" defTabSz="914400" rtl="0" eaLnBrk="1" latinLnBrk="0" hangingPunct="1">
-              <a:lnSpc>
-                <a:spcPct val="90000"/>
-              </a:lnSpc>
-              <a:spcBef>
-                <a:spcPts val="600"/>
-              </a:spcBef>
-              <a:buFont typeface="Euphemia" pitchFamily="34" charset="0"/>
-              <a:buChar char="›"/>
-              <a:defRPr sz="1800" kern="1200">
-                <a:solidFill>
-                  <a:schemeClr val="tx1"/>
-                </a:solidFill>
-                <a:latin typeface="+mn-lt"/>
-                <a:ea typeface="+mn-ea"/>
-                <a:cs typeface="+mn-cs"/>
-              </a:defRPr>
-            </a:lvl7pPr>
-            <a:lvl8pPr marL="2807208" indent="-246888" algn="l" defTabSz="914400" rtl="0" eaLnBrk="1" latinLnBrk="0" hangingPunct="1">
-              <a:lnSpc>
-                <a:spcPct val="90000"/>
-              </a:lnSpc>
-              <a:spcBef>
-                <a:spcPts val="600"/>
-              </a:spcBef>
-              <a:buFont typeface="Euphemia" pitchFamily="34" charset="0"/>
-              <a:buChar char="–"/>
-              <a:defRPr sz="1800" kern="1200" baseline="0">
-                <a:solidFill>
-                  <a:schemeClr val="tx1"/>
-                </a:solidFill>
-                <a:latin typeface="+mn-lt"/>
-                <a:ea typeface="+mn-ea"/>
-                <a:cs typeface="+mn-cs"/>
-              </a:defRPr>
-            </a:lvl8pPr>
-            <a:lvl9pPr marL="3172968" indent="-246888" algn="l" defTabSz="914400" rtl="0" eaLnBrk="1" latinLnBrk="0" hangingPunct="1">
-              <a:lnSpc>
-                <a:spcPct val="90000"/>
-              </a:lnSpc>
-              <a:spcBef>
-                <a:spcPts val="600"/>
-              </a:spcBef>
-              <a:buFont typeface="Euphemia" pitchFamily="34" charset="0"/>
-              <a:buChar char="›"/>
-              <a:defRPr sz="1800" kern="1200" baseline="0">
-                <a:solidFill>
-                  <a:schemeClr val="tx1"/>
-                </a:solidFill>
-                <a:latin typeface="+mn-lt"/>
-                <a:ea typeface="+mn-ea"/>
-                <a:cs typeface="+mn-cs"/>
-              </a:defRPr>
-            </a:lvl9pPr>
-          </a:lstStyle>
-          <a:p>
-            <a:r>
-              <a:rPr lang="zh-CN" altLang="en-US">
-                <a:solidFill>
-                  <a:schemeClr val="accent4"/>
-                </a:solidFill>
-                <a:latin typeface="Arial" panose="020B0604020202020204" pitchFamily="34" charset="0"/>
-                <a:sym typeface="Arial" panose="020B0604020202020204" pitchFamily="34" charset="0"/>
-              </a:rPr>
-              <a:t>分享人：</a:t>
-            </a:r>
-            <a:r>
-              <a:rPr lang="en-US" altLang="zh-CN">
-                <a:solidFill>
-                  <a:schemeClr val="accent4"/>
-                </a:solidFill>
-                <a:latin typeface="Arial" panose="020B0604020202020204" pitchFamily="34" charset="0"/>
-                <a:sym typeface="Arial" panose="020B0604020202020204" pitchFamily="34" charset="0"/>
-              </a:rPr>
-              <a:t>Ai</a:t>
-            </a:r>
-            <a:r>
-              <a:rPr lang="zh-CN" altLang="en-US">
-                <a:solidFill>
-                  <a:schemeClr val="accent4"/>
-                </a:solidFill>
-                <a:latin typeface="Arial" panose="020B0604020202020204" pitchFamily="34" charset="0"/>
-                <a:sym typeface="Arial" panose="020B0604020202020204" pitchFamily="34" charset="0"/>
-              </a:rPr>
-              <a:t>兔兔</a:t>
-            </a:r>
-            <a:endParaRPr lang="en-US" altLang="zh-CN">
-              <a:solidFill>
-                <a:schemeClr val="accent4"/>
-              </a:solidFill>
-              <a:latin typeface="Arial" panose="020B0604020202020204" pitchFamily="34" charset="0"/>
-              <a:sym typeface="Arial" panose="020B0604020202020204" pitchFamily="34" charset="0"/>
-            </a:endParaRPr>
-          </a:p>
-          <a:p>
-            <a:r>
-              <a:rPr lang="en-US" altLang="zh-CN">
-                <a:solidFill>
-                  <a:schemeClr val="accent4"/>
-                </a:solidFill>
-                <a:latin typeface="Arial" panose="020B0604020202020204" pitchFamily="34" charset="0"/>
-                <a:sym typeface="Arial" panose="020B0604020202020204" pitchFamily="34" charset="0"/>
-              </a:rPr>
-              <a:t>Blog</a:t>
-            </a:r>
-            <a:r>
-              <a:rPr lang="zh-CN" altLang="en-US">
-                <a:solidFill>
-                  <a:schemeClr val="accent4"/>
-                </a:solidFill>
-                <a:latin typeface="Arial" panose="020B0604020202020204" pitchFamily="34" charset="0"/>
-                <a:sym typeface="Arial" panose="020B0604020202020204" pitchFamily="34" charset="0"/>
-              </a:rPr>
-              <a:t>：</a:t>
-            </a:r>
-            <a:r>
-              <a:rPr lang="en-US" altLang="zh-CN">
-                <a:hlinkClick r:id="rId2"/>
-              </a:rPr>
-              <a:t>http://sakigami-yang.me/</a:t>
-            </a:r>
-            <a:endParaRPr lang="en-US" altLang="zh-CN"/>
-          </a:p>
-          <a:p>
-            <a:r>
-              <a:rPr lang="en-US" altLang="zh-CN">
-                <a:solidFill>
-                  <a:schemeClr val="accent4"/>
-                </a:solidFill>
-                <a:latin typeface="Arial" panose="020B0604020202020204" pitchFamily="34" charset="0"/>
-                <a:sym typeface="Arial" panose="020B0604020202020204" pitchFamily="34" charset="0"/>
-              </a:rPr>
-              <a:t>Github</a:t>
-            </a:r>
-            <a:r>
-              <a:rPr lang="zh-CN" altLang="en-US">
-                <a:solidFill>
-                  <a:schemeClr val="accent4"/>
-                </a:solidFill>
-                <a:latin typeface="Arial" panose="020B0604020202020204" pitchFamily="34" charset="0"/>
-                <a:sym typeface="Arial" panose="020B0604020202020204" pitchFamily="34" charset="0"/>
-              </a:rPr>
-              <a:t>：</a:t>
-            </a:r>
-            <a:r>
-              <a:rPr lang="en-US" altLang="zh-CN">
-                <a:hlinkClick r:id="rId3"/>
-              </a:rPr>
-              <a:t>https://github.com/SakigamiYang</a:t>
-            </a:r>
-            <a:endParaRPr lang="zh-CN" altLang="en-US" dirty="0">
-              <a:solidFill>
-                <a:schemeClr val="accent4"/>
-              </a:solidFill>
-              <a:latin typeface="Arial" panose="020B0604020202020204" pitchFamily="34" charset="0"/>
-              <a:sym typeface="Arial" panose="020B0604020202020204" pitchFamily="34" charset="0"/>
-            </a:endParaRPr>
+            <a:pPr algn="ctr"/>
+            <a:r>
+              <a:rPr lang="zh-CN" altLang="en-US" dirty="0"/>
+              <a:t>算数学</a:t>
+            </a:r>
           </a:p>
         </p:txBody>
       </p:sp>
     </p:spTree>
     <p:extLst>
       <p:ext uri="{BB962C8B-B14F-4D97-AF65-F5344CB8AC3E}">
-        <p14:creationId xmlns:p14="http://schemas.microsoft.com/office/powerpoint/2010/main" val="206787478"/>
+        <p14:creationId xmlns:p14="http://schemas.microsoft.com/office/powerpoint/2010/main" val="2388779250"/>
       </p:ext>
     </p:extLst>
   </p:cSld>
   <p:clrMapOvr>
     <a:masterClrMapping/>
   </p:clrMapOvr>
-  <mc:AlternateContent xmlns:mc="http://schemas.openxmlformats.org/markup-compatibility/2006" xmlns:p14="http://schemas.microsoft.com/office/powerpoint/2010/main">
-    <mc:Choice Requires="p14">
+  <mc:AlternateContent xmlns:mc="http://schemas.openxmlformats.org/markup-compatibility/2006">
+    <mc:Choice xmlns:p14="http://schemas.microsoft.com/office/powerpoint/2010/main" Requires="p14">
       <p:transition spd="med" p14:dur="700">
         <p:fade/>
       </p:transition>
     </mc:Choice>
-    <mc:Fallback xmlns="">
+    <mc:Fallback>
       <p:transition spd="med">
         <p:fade/>
       </p:transition>
     </mc:Fallback>
   </mc:AlternateContent>
+</p:sld>
+</file>
+
+<file path=ppt/slides/slide19.xml><?xml version="1.0" encoding="utf-8"?>
+<p:sld xmlns:a="http://schemas.openxmlformats.org/drawingml/2006/main" xmlns:r="http://schemas.openxmlformats.org/officeDocument/2006/relationships" xmlns:p="http://schemas.openxmlformats.org/presentationml/2006/main">
+  <p:cSld>
+    <p:spTree>
+      <p:nvGrpSpPr>
+        <p:cNvPr id="1" name=""/>
+        <p:cNvGrpSpPr/>
+        <p:nvPr/>
+      </p:nvGrpSpPr>
+      <p:grpSpPr>
+        <a:xfrm>
+          <a:off x="0" y="0"/>
+          <a:ext cx="0" cy="0"/>
+          <a:chOff x="0" y="0"/>
+          <a:chExt cx="0" cy="0"/>
+        </a:xfrm>
+      </p:grpSpPr>
+      <p:sp>
+        <p:nvSpPr>
+          <p:cNvPr id="2" name="标题 1">
+            <a:extLst>
+              <a:ext uri="{FF2B5EF4-FFF2-40B4-BE49-F238E27FC236}">
+                <a16:creationId xmlns:a16="http://schemas.microsoft.com/office/drawing/2014/main" id="{F6FBF821-1EBB-4608-A353-34065F24C6C6}"/>
+              </a:ext>
+            </a:extLst>
+          </p:cNvPr>
+          <p:cNvSpPr>
+            <a:spLocks noGrp="1"/>
+          </p:cNvSpPr>
+          <p:nvPr>
+            <p:ph type="title"/>
+          </p:nvPr>
+        </p:nvSpPr>
+        <p:spPr>
+          <a:xfrm>
+            <a:off x="1593436" y="177801"/>
+            <a:ext cx="9782801" cy="874936"/>
+          </a:xfrm>
+        </p:spPr>
+        <p:txBody>
+          <a:bodyPr/>
+          <a:lstStyle/>
+          <a:p>
+            <a:r>
+              <a:rPr lang="zh-CN" altLang="en-US" dirty="0">
+                <a:latin typeface="Arial" panose="020B0604020202020204" pitchFamily="34" charset="0"/>
+                <a:sym typeface="Arial" panose="020B0604020202020204" pitchFamily="34" charset="0"/>
+              </a:rPr>
+              <a:t>算法研究人员</a:t>
+            </a:r>
+            <a:endParaRPr lang="zh-CN" altLang="en-US" dirty="0"/>
+          </a:p>
+        </p:txBody>
+      </p:sp>
+      <p:sp>
+        <p:nvSpPr>
+          <p:cNvPr id="15" name="椭圆 14">
+            <a:extLst>
+              <a:ext uri="{FF2B5EF4-FFF2-40B4-BE49-F238E27FC236}">
+                <a16:creationId xmlns:a16="http://schemas.microsoft.com/office/drawing/2014/main" id="{DDD1B9C6-EE12-4A29-B6DD-718D7F5A16BE}"/>
+              </a:ext>
+            </a:extLst>
+          </p:cNvPr>
+          <p:cNvSpPr/>
+          <p:nvPr/>
+        </p:nvSpPr>
+        <p:spPr>
+          <a:xfrm>
+            <a:off x="5230316" y="5348064"/>
+            <a:ext cx="1440160" cy="914400"/>
+          </a:xfrm>
+          <a:prstGeom prst="ellipse">
+            <a:avLst/>
+          </a:prstGeom>
+        </p:spPr>
+        <p:style>
+          <a:lnRef idx="2">
+            <a:schemeClr val="accent1">
+              <a:shade val="50000"/>
+            </a:schemeClr>
+          </a:lnRef>
+          <a:fillRef idx="1">
+            <a:schemeClr val="accent1"/>
+          </a:fillRef>
+          <a:effectRef idx="0">
+            <a:schemeClr val="accent1"/>
+          </a:effectRef>
+          <a:fontRef idx="minor">
+            <a:schemeClr val="lt1"/>
+          </a:fontRef>
+        </p:style>
+        <p:txBody>
+          <a:bodyPr rtlCol="0" anchor="ctr"/>
+          <a:lstStyle/>
+          <a:p>
+            <a:pPr algn="ctr"/>
+            <a:r>
+              <a:rPr lang="zh-CN" altLang="en-US" dirty="0"/>
+              <a:t>多项式</a:t>
+            </a:r>
+          </a:p>
+        </p:txBody>
+      </p:sp>
+      <p:sp>
+        <p:nvSpPr>
+          <p:cNvPr id="18" name="椭圆 17">
+            <a:extLst>
+              <a:ext uri="{FF2B5EF4-FFF2-40B4-BE49-F238E27FC236}">
+                <a16:creationId xmlns:a16="http://schemas.microsoft.com/office/drawing/2014/main" id="{578E52D5-C083-4CB8-A428-7097890F0AA4}"/>
+              </a:ext>
+            </a:extLst>
+          </p:cNvPr>
+          <p:cNvSpPr/>
+          <p:nvPr/>
+        </p:nvSpPr>
+        <p:spPr>
+          <a:xfrm>
+            <a:off x="8491188" y="5038048"/>
+            <a:ext cx="1440160" cy="914400"/>
+          </a:xfrm>
+          <a:prstGeom prst="ellipse">
+            <a:avLst/>
+          </a:prstGeom>
+        </p:spPr>
+        <p:style>
+          <a:lnRef idx="2">
+            <a:schemeClr val="accent1">
+              <a:shade val="50000"/>
+            </a:schemeClr>
+          </a:lnRef>
+          <a:fillRef idx="1">
+            <a:schemeClr val="accent1"/>
+          </a:fillRef>
+          <a:effectRef idx="0">
+            <a:schemeClr val="accent1"/>
+          </a:effectRef>
+          <a:fontRef idx="minor">
+            <a:schemeClr val="lt1"/>
+          </a:fontRef>
+        </p:style>
+        <p:txBody>
+          <a:bodyPr rtlCol="0" anchor="ctr"/>
+          <a:lstStyle/>
+          <a:p>
+            <a:pPr algn="ctr"/>
+            <a:r>
+              <a:rPr lang="zh-CN" altLang="en-US" dirty="0"/>
+              <a:t>集合</a:t>
+            </a:r>
+          </a:p>
+        </p:txBody>
+      </p:sp>
+      <p:sp>
+        <p:nvSpPr>
+          <p:cNvPr id="21" name="椭圆 20">
+            <a:extLst>
+              <a:ext uri="{FF2B5EF4-FFF2-40B4-BE49-F238E27FC236}">
+                <a16:creationId xmlns:a16="http://schemas.microsoft.com/office/drawing/2014/main" id="{177E31A2-CFC0-483D-8C80-DFD64119C10A}"/>
+              </a:ext>
+            </a:extLst>
+          </p:cNvPr>
+          <p:cNvSpPr/>
+          <p:nvPr/>
+        </p:nvSpPr>
+        <p:spPr>
+          <a:xfrm>
+            <a:off x="9918831" y="3782456"/>
+            <a:ext cx="1440160" cy="914400"/>
+          </a:xfrm>
+          <a:prstGeom prst="ellipse">
+            <a:avLst/>
+          </a:prstGeom>
+        </p:spPr>
+        <p:style>
+          <a:lnRef idx="2">
+            <a:schemeClr val="accent1">
+              <a:shade val="50000"/>
+            </a:schemeClr>
+          </a:lnRef>
+          <a:fillRef idx="1">
+            <a:schemeClr val="accent1"/>
+          </a:fillRef>
+          <a:effectRef idx="0">
+            <a:schemeClr val="accent1"/>
+          </a:effectRef>
+          <a:fontRef idx="minor">
+            <a:schemeClr val="lt1"/>
+          </a:fontRef>
+        </p:style>
+        <p:txBody>
+          <a:bodyPr rtlCol="0" anchor="ctr"/>
+          <a:lstStyle/>
+          <a:p>
+            <a:pPr algn="ctr"/>
+            <a:r>
+              <a:rPr lang="zh-CN" altLang="en-US" dirty="0"/>
+              <a:t>图论</a:t>
+            </a:r>
+          </a:p>
+        </p:txBody>
+      </p:sp>
+      <p:sp>
+        <p:nvSpPr>
+          <p:cNvPr id="25" name="椭圆 24">
+            <a:extLst>
+              <a:ext uri="{FF2B5EF4-FFF2-40B4-BE49-F238E27FC236}">
+                <a16:creationId xmlns:a16="http://schemas.microsoft.com/office/drawing/2014/main" id="{4A867C62-8B27-40BD-8A2C-D903CC4500FA}"/>
+              </a:ext>
+            </a:extLst>
+          </p:cNvPr>
+          <p:cNvSpPr/>
+          <p:nvPr/>
+        </p:nvSpPr>
+        <p:spPr>
+          <a:xfrm>
+            <a:off x="6643030" y="4239656"/>
+            <a:ext cx="1440160" cy="914400"/>
+          </a:xfrm>
+          <a:prstGeom prst="ellipse">
+            <a:avLst/>
+          </a:prstGeom>
+        </p:spPr>
+        <p:style>
+          <a:lnRef idx="2">
+            <a:schemeClr val="accent1">
+              <a:shade val="50000"/>
+            </a:schemeClr>
+          </a:lnRef>
+          <a:fillRef idx="1">
+            <a:schemeClr val="accent1"/>
+          </a:fillRef>
+          <a:effectRef idx="0">
+            <a:schemeClr val="accent1"/>
+          </a:effectRef>
+          <a:fontRef idx="minor">
+            <a:schemeClr val="lt1"/>
+          </a:fontRef>
+        </p:style>
+        <p:txBody>
+          <a:bodyPr rtlCol="0" anchor="ctr"/>
+          <a:lstStyle/>
+          <a:p>
+            <a:pPr algn="ctr"/>
+            <a:r>
+              <a:rPr lang="zh-CN" altLang="en-US" dirty="0"/>
+              <a:t>群论</a:t>
+            </a:r>
+          </a:p>
+        </p:txBody>
+      </p:sp>
+      <p:sp>
+        <p:nvSpPr>
+          <p:cNvPr id="6" name="矩形 5">
+            <a:extLst>
+              <a:ext uri="{FF2B5EF4-FFF2-40B4-BE49-F238E27FC236}">
+                <a16:creationId xmlns:a16="http://schemas.microsoft.com/office/drawing/2014/main" id="{A924A93B-9AC9-46A6-B3C2-EE1041ABC58F}"/>
+              </a:ext>
+            </a:extLst>
+          </p:cNvPr>
+          <p:cNvSpPr/>
+          <p:nvPr/>
+        </p:nvSpPr>
+        <p:spPr>
+          <a:xfrm>
+            <a:off x="4989168" y="2459700"/>
+            <a:ext cx="1440160" cy="684076"/>
+          </a:xfrm>
+          <a:prstGeom prst="rect">
+            <a:avLst/>
+          </a:prstGeom>
+        </p:spPr>
+        <p:style>
+          <a:lnRef idx="2">
+            <a:schemeClr val="accent2">
+              <a:shade val="50000"/>
+            </a:schemeClr>
+          </a:lnRef>
+          <a:fillRef idx="1">
+            <a:schemeClr val="accent2"/>
+          </a:fillRef>
+          <a:effectRef idx="0">
+            <a:schemeClr val="accent2"/>
+          </a:effectRef>
+          <a:fontRef idx="minor">
+            <a:schemeClr val="lt1"/>
+          </a:fontRef>
+        </p:style>
+        <p:txBody>
+          <a:bodyPr rtlCol="0" anchor="ctr"/>
+          <a:lstStyle/>
+          <a:p>
+            <a:pPr algn="ctr"/>
+            <a:r>
+              <a:rPr lang="zh-CN" altLang="en-US" dirty="0"/>
+              <a:t>线性代数</a:t>
+            </a:r>
+          </a:p>
+        </p:txBody>
+      </p:sp>
+      <p:sp>
+        <p:nvSpPr>
+          <p:cNvPr id="26" name="矩形 25">
+            <a:extLst>
+              <a:ext uri="{FF2B5EF4-FFF2-40B4-BE49-F238E27FC236}">
+                <a16:creationId xmlns:a16="http://schemas.microsoft.com/office/drawing/2014/main" id="{6F9DB88A-3812-4F56-B99B-794ABB907225}"/>
+              </a:ext>
+            </a:extLst>
+          </p:cNvPr>
+          <p:cNvSpPr/>
+          <p:nvPr/>
+        </p:nvSpPr>
+        <p:spPr>
+          <a:xfrm>
+            <a:off x="6484836" y="1361906"/>
+            <a:ext cx="1440160" cy="684076"/>
+          </a:xfrm>
+          <a:prstGeom prst="rect">
+            <a:avLst/>
+          </a:prstGeom>
+        </p:spPr>
+        <p:style>
+          <a:lnRef idx="2">
+            <a:schemeClr val="accent2">
+              <a:shade val="50000"/>
+            </a:schemeClr>
+          </a:lnRef>
+          <a:fillRef idx="1">
+            <a:schemeClr val="accent2"/>
+          </a:fillRef>
+          <a:effectRef idx="0">
+            <a:schemeClr val="accent2"/>
+          </a:effectRef>
+          <a:fontRef idx="minor">
+            <a:schemeClr val="lt1"/>
+          </a:fontRef>
+        </p:style>
+        <p:txBody>
+          <a:bodyPr rtlCol="0" anchor="ctr"/>
+          <a:lstStyle/>
+          <a:p>
+            <a:pPr algn="ctr"/>
+            <a:r>
+              <a:rPr lang="zh-CN" altLang="en-US" dirty="0"/>
+              <a:t>抽象代数</a:t>
+            </a:r>
+          </a:p>
+        </p:txBody>
+      </p:sp>
+      <p:sp>
+        <p:nvSpPr>
+          <p:cNvPr id="27" name="矩形 26">
+            <a:extLst>
+              <a:ext uri="{FF2B5EF4-FFF2-40B4-BE49-F238E27FC236}">
+                <a16:creationId xmlns:a16="http://schemas.microsoft.com/office/drawing/2014/main" id="{1B38759A-F121-4A98-BD97-D183C92121F6}"/>
+              </a:ext>
+            </a:extLst>
+          </p:cNvPr>
+          <p:cNvSpPr/>
+          <p:nvPr/>
+        </p:nvSpPr>
+        <p:spPr>
+          <a:xfrm>
+            <a:off x="8459032" y="2452453"/>
+            <a:ext cx="1440160" cy="684076"/>
+          </a:xfrm>
+          <a:prstGeom prst="rect">
+            <a:avLst/>
+          </a:prstGeom>
+        </p:spPr>
+        <p:style>
+          <a:lnRef idx="2">
+            <a:schemeClr val="accent2">
+              <a:shade val="50000"/>
+            </a:schemeClr>
+          </a:lnRef>
+          <a:fillRef idx="1">
+            <a:schemeClr val="accent2"/>
+          </a:fillRef>
+          <a:effectRef idx="0">
+            <a:schemeClr val="accent2"/>
+          </a:effectRef>
+          <a:fontRef idx="minor">
+            <a:schemeClr val="lt1"/>
+          </a:fontRef>
+        </p:style>
+        <p:txBody>
+          <a:bodyPr rtlCol="0" anchor="ctr"/>
+          <a:lstStyle/>
+          <a:p>
+            <a:pPr algn="ctr"/>
+            <a:r>
+              <a:rPr lang="zh-CN" altLang="en-US" dirty="0"/>
+              <a:t>离散数学</a:t>
+            </a:r>
+          </a:p>
+        </p:txBody>
+      </p:sp>
+      <p:sp>
+        <p:nvSpPr>
+          <p:cNvPr id="28" name="矩形 27">
+            <a:extLst>
+              <a:ext uri="{FF2B5EF4-FFF2-40B4-BE49-F238E27FC236}">
+                <a16:creationId xmlns:a16="http://schemas.microsoft.com/office/drawing/2014/main" id="{F931A6D4-35D3-412A-ADC4-60815755109D}"/>
+              </a:ext>
+            </a:extLst>
+          </p:cNvPr>
+          <p:cNvSpPr/>
+          <p:nvPr/>
+        </p:nvSpPr>
+        <p:spPr>
+          <a:xfrm>
+            <a:off x="3358108" y="1437256"/>
+            <a:ext cx="1440160" cy="684076"/>
+          </a:xfrm>
+          <a:prstGeom prst="rect">
+            <a:avLst/>
+          </a:prstGeom>
+        </p:spPr>
+        <p:style>
+          <a:lnRef idx="2">
+            <a:schemeClr val="accent2">
+              <a:shade val="50000"/>
+            </a:schemeClr>
+          </a:lnRef>
+          <a:fillRef idx="1">
+            <a:schemeClr val="accent2"/>
+          </a:fillRef>
+          <a:effectRef idx="0">
+            <a:schemeClr val="accent2"/>
+          </a:effectRef>
+          <a:fontRef idx="minor">
+            <a:schemeClr val="lt1"/>
+          </a:fontRef>
+        </p:style>
+        <p:txBody>
+          <a:bodyPr rtlCol="0" anchor="ctr"/>
+          <a:lstStyle/>
+          <a:p>
+            <a:pPr algn="ctr"/>
+            <a:r>
+              <a:rPr lang="zh-CN" altLang="en-US" dirty="0"/>
+              <a:t>分析数学</a:t>
+            </a:r>
+          </a:p>
+        </p:txBody>
+      </p:sp>
+      <p:sp>
+        <p:nvSpPr>
+          <p:cNvPr id="29" name="矩形 28">
+            <a:extLst>
+              <a:ext uri="{FF2B5EF4-FFF2-40B4-BE49-F238E27FC236}">
+                <a16:creationId xmlns:a16="http://schemas.microsoft.com/office/drawing/2014/main" id="{41C66AB7-640F-4693-86FE-FD46E15BEDA8}"/>
+              </a:ext>
+            </a:extLst>
+          </p:cNvPr>
+          <p:cNvSpPr/>
+          <p:nvPr/>
+        </p:nvSpPr>
+        <p:spPr>
+          <a:xfrm>
+            <a:off x="9694812" y="1068519"/>
+            <a:ext cx="1440160" cy="684076"/>
+          </a:xfrm>
+          <a:prstGeom prst="rect">
+            <a:avLst/>
+          </a:prstGeom>
+        </p:spPr>
+        <p:style>
+          <a:lnRef idx="2">
+            <a:schemeClr val="accent2">
+              <a:shade val="50000"/>
+            </a:schemeClr>
+          </a:lnRef>
+          <a:fillRef idx="1">
+            <a:schemeClr val="accent2"/>
+          </a:fillRef>
+          <a:effectRef idx="0">
+            <a:schemeClr val="accent2"/>
+          </a:effectRef>
+          <a:fontRef idx="minor">
+            <a:schemeClr val="lt1"/>
+          </a:fontRef>
+        </p:style>
+        <p:txBody>
+          <a:bodyPr rtlCol="0" anchor="ctr"/>
+          <a:lstStyle/>
+          <a:p>
+            <a:pPr algn="ctr"/>
+            <a:r>
+              <a:rPr lang="zh-CN" altLang="en-US" dirty="0"/>
+              <a:t>拓扑学</a:t>
+            </a:r>
+          </a:p>
+        </p:txBody>
+      </p:sp>
+      <p:sp>
+        <p:nvSpPr>
+          <p:cNvPr id="30" name="椭圆 29">
+            <a:extLst>
+              <a:ext uri="{FF2B5EF4-FFF2-40B4-BE49-F238E27FC236}">
+                <a16:creationId xmlns:a16="http://schemas.microsoft.com/office/drawing/2014/main" id="{0EFAFA80-1F8A-44E7-AD8C-D28B8C6A42C1}"/>
+              </a:ext>
+            </a:extLst>
+          </p:cNvPr>
+          <p:cNvSpPr/>
+          <p:nvPr/>
+        </p:nvSpPr>
+        <p:spPr>
+          <a:xfrm>
+            <a:off x="3244783" y="3782456"/>
+            <a:ext cx="2088232" cy="914400"/>
+          </a:xfrm>
+          <a:prstGeom prst="ellipse">
+            <a:avLst/>
+          </a:prstGeom>
+        </p:spPr>
+        <p:style>
+          <a:lnRef idx="2">
+            <a:schemeClr val="accent1">
+              <a:shade val="50000"/>
+            </a:schemeClr>
+          </a:lnRef>
+          <a:fillRef idx="1">
+            <a:schemeClr val="accent1"/>
+          </a:fillRef>
+          <a:effectRef idx="0">
+            <a:schemeClr val="accent1"/>
+          </a:effectRef>
+          <a:fontRef idx="minor">
+            <a:schemeClr val="lt1"/>
+          </a:fontRef>
+        </p:style>
+        <p:txBody>
+          <a:bodyPr rtlCol="0" anchor="ctr"/>
+          <a:lstStyle/>
+          <a:p>
+            <a:pPr algn="ctr"/>
+            <a:r>
+              <a:rPr lang="zh-CN" altLang="en-US" dirty="0"/>
+              <a:t>傅里叶分析</a:t>
+            </a:r>
+          </a:p>
+        </p:txBody>
+      </p:sp>
+      <p:sp>
+        <p:nvSpPr>
+          <p:cNvPr id="31" name="椭圆 30">
+            <a:extLst>
+              <a:ext uri="{FF2B5EF4-FFF2-40B4-BE49-F238E27FC236}">
+                <a16:creationId xmlns:a16="http://schemas.microsoft.com/office/drawing/2014/main" id="{4DBCAB4D-BF4A-4409-A254-9F6404D79388}"/>
+              </a:ext>
+            </a:extLst>
+          </p:cNvPr>
+          <p:cNvSpPr/>
+          <p:nvPr/>
+        </p:nvSpPr>
+        <p:spPr>
+          <a:xfrm>
+            <a:off x="1811090" y="4797506"/>
+            <a:ext cx="1440160" cy="914400"/>
+          </a:xfrm>
+          <a:prstGeom prst="ellipse">
+            <a:avLst/>
+          </a:prstGeom>
+        </p:spPr>
+        <p:style>
+          <a:lnRef idx="2">
+            <a:schemeClr val="accent1">
+              <a:shade val="50000"/>
+            </a:schemeClr>
+          </a:lnRef>
+          <a:fillRef idx="1">
+            <a:schemeClr val="accent1"/>
+          </a:fillRef>
+          <a:effectRef idx="0">
+            <a:schemeClr val="accent1"/>
+          </a:effectRef>
+          <a:fontRef idx="minor">
+            <a:schemeClr val="lt1"/>
+          </a:fontRef>
+        </p:style>
+        <p:txBody>
+          <a:bodyPr rtlCol="0" anchor="ctr"/>
+          <a:lstStyle/>
+          <a:p>
+            <a:pPr algn="ctr"/>
+            <a:r>
+              <a:rPr lang="zh-CN" altLang="en-US" dirty="0"/>
+              <a:t>算数学</a:t>
+            </a:r>
+          </a:p>
+        </p:txBody>
+      </p:sp>
+      <p:sp>
+        <p:nvSpPr>
+          <p:cNvPr id="32" name="矩形 31">
+            <a:extLst>
+              <a:ext uri="{FF2B5EF4-FFF2-40B4-BE49-F238E27FC236}">
+                <a16:creationId xmlns:a16="http://schemas.microsoft.com/office/drawing/2014/main" id="{0E21E180-C9B7-4A89-B45E-A1D4A31C17BC}"/>
+              </a:ext>
+            </a:extLst>
+          </p:cNvPr>
+          <p:cNvSpPr/>
+          <p:nvPr/>
+        </p:nvSpPr>
+        <p:spPr>
+          <a:xfrm>
+            <a:off x="1736204" y="2425487"/>
+            <a:ext cx="1440160" cy="684076"/>
+          </a:xfrm>
+          <a:prstGeom prst="rect">
+            <a:avLst/>
+          </a:prstGeom>
+        </p:spPr>
+        <p:style>
+          <a:lnRef idx="2">
+            <a:schemeClr val="accent2">
+              <a:shade val="50000"/>
+            </a:schemeClr>
+          </a:lnRef>
+          <a:fillRef idx="1">
+            <a:schemeClr val="accent2"/>
+          </a:fillRef>
+          <a:effectRef idx="0">
+            <a:schemeClr val="accent2"/>
+          </a:effectRef>
+          <a:fontRef idx="minor">
+            <a:schemeClr val="lt1"/>
+          </a:fontRef>
+        </p:style>
+        <p:txBody>
+          <a:bodyPr rtlCol="0" anchor="ctr"/>
+          <a:lstStyle/>
+          <a:p>
+            <a:pPr algn="ctr"/>
+            <a:r>
+              <a:rPr lang="zh-CN" altLang="en-US" dirty="0"/>
+              <a:t>数论</a:t>
+            </a:r>
+          </a:p>
+        </p:txBody>
+      </p:sp>
+      <p:cxnSp>
+        <p:nvCxnSpPr>
+          <p:cNvPr id="8" name="直接箭头连接符 7">
+            <a:extLst>
+              <a:ext uri="{FF2B5EF4-FFF2-40B4-BE49-F238E27FC236}">
+                <a16:creationId xmlns:a16="http://schemas.microsoft.com/office/drawing/2014/main" id="{944BBCCE-7AAD-4732-B27B-B6B7EF888DEB}"/>
+              </a:ext>
+            </a:extLst>
+          </p:cNvPr>
+          <p:cNvCxnSpPr>
+            <a:stCxn id="31" idx="0"/>
+            <a:endCxn id="32" idx="2"/>
+          </p:cNvCxnSpPr>
+          <p:nvPr/>
+        </p:nvCxnSpPr>
+        <p:spPr>
+          <a:xfrm flipH="1" flipV="1">
+            <a:off x="2456284" y="3109563"/>
+            <a:ext cx="74886" cy="1687943"/>
+          </a:xfrm>
+          <a:prstGeom prst="straightConnector1">
+            <a:avLst/>
+          </a:prstGeom>
+          <a:ln>
+            <a:tailEnd type="triangle"/>
+          </a:ln>
+        </p:spPr>
+        <p:style>
+          <a:lnRef idx="3">
+            <a:schemeClr val="dk1"/>
+          </a:lnRef>
+          <a:fillRef idx="0">
+            <a:schemeClr val="dk1"/>
+          </a:fillRef>
+          <a:effectRef idx="2">
+            <a:schemeClr val="dk1"/>
+          </a:effectRef>
+          <a:fontRef idx="minor">
+            <a:schemeClr val="tx1"/>
+          </a:fontRef>
+        </p:style>
+      </p:cxnSp>
+      <p:cxnSp>
+        <p:nvCxnSpPr>
+          <p:cNvPr id="33" name="直接箭头连接符 32">
+            <a:extLst>
+              <a:ext uri="{FF2B5EF4-FFF2-40B4-BE49-F238E27FC236}">
+                <a16:creationId xmlns:a16="http://schemas.microsoft.com/office/drawing/2014/main" id="{6C7EF214-C9CA-4798-BEFA-FF456B8AEE66}"/>
+              </a:ext>
+            </a:extLst>
+          </p:cNvPr>
+          <p:cNvCxnSpPr>
+            <a:cxnSpLocks/>
+            <a:stCxn id="30" idx="0"/>
+            <a:endCxn id="28" idx="2"/>
+          </p:cNvCxnSpPr>
+          <p:nvPr/>
+        </p:nvCxnSpPr>
+        <p:spPr>
+          <a:xfrm flipH="1" flipV="1">
+            <a:off x="4078188" y="2121332"/>
+            <a:ext cx="210711" cy="1661124"/>
+          </a:xfrm>
+          <a:prstGeom prst="straightConnector1">
+            <a:avLst/>
+          </a:prstGeom>
+          <a:ln>
+            <a:tailEnd type="triangle"/>
+          </a:ln>
+        </p:spPr>
+        <p:style>
+          <a:lnRef idx="3">
+            <a:schemeClr val="dk1"/>
+          </a:lnRef>
+          <a:fillRef idx="0">
+            <a:schemeClr val="dk1"/>
+          </a:fillRef>
+          <a:effectRef idx="2">
+            <a:schemeClr val="dk1"/>
+          </a:effectRef>
+          <a:fontRef idx="minor">
+            <a:schemeClr val="tx1"/>
+          </a:fontRef>
+        </p:style>
+      </p:cxnSp>
+      <p:cxnSp>
+        <p:nvCxnSpPr>
+          <p:cNvPr id="34" name="直接箭头连接符 33">
+            <a:extLst>
+              <a:ext uri="{FF2B5EF4-FFF2-40B4-BE49-F238E27FC236}">
+                <a16:creationId xmlns:a16="http://schemas.microsoft.com/office/drawing/2014/main" id="{9953689D-A888-46C7-9F32-327A4793C892}"/>
+              </a:ext>
+            </a:extLst>
+          </p:cNvPr>
+          <p:cNvCxnSpPr>
+            <a:cxnSpLocks/>
+            <a:stCxn id="15" idx="0"/>
+            <a:endCxn id="6" idx="2"/>
+          </p:cNvCxnSpPr>
+          <p:nvPr/>
+        </p:nvCxnSpPr>
+        <p:spPr>
+          <a:xfrm flipH="1" flipV="1">
+            <a:off x="5709248" y="3143776"/>
+            <a:ext cx="241148" cy="2204288"/>
+          </a:xfrm>
+          <a:prstGeom prst="straightConnector1">
+            <a:avLst/>
+          </a:prstGeom>
+          <a:ln>
+            <a:tailEnd type="triangle"/>
+          </a:ln>
+        </p:spPr>
+        <p:style>
+          <a:lnRef idx="3">
+            <a:schemeClr val="dk1"/>
+          </a:lnRef>
+          <a:fillRef idx="0">
+            <a:schemeClr val="dk1"/>
+          </a:fillRef>
+          <a:effectRef idx="2">
+            <a:schemeClr val="dk1"/>
+          </a:effectRef>
+          <a:fontRef idx="minor">
+            <a:schemeClr val="tx1"/>
+          </a:fontRef>
+        </p:style>
+      </p:cxnSp>
+      <p:cxnSp>
+        <p:nvCxnSpPr>
+          <p:cNvPr id="36" name="直接箭头连接符 35">
+            <a:extLst>
+              <a:ext uri="{FF2B5EF4-FFF2-40B4-BE49-F238E27FC236}">
+                <a16:creationId xmlns:a16="http://schemas.microsoft.com/office/drawing/2014/main" id="{0BB55E3C-0964-43B6-B626-1C820B06B36A}"/>
+              </a:ext>
+            </a:extLst>
+          </p:cNvPr>
+          <p:cNvCxnSpPr>
+            <a:cxnSpLocks/>
+            <a:stCxn id="25" idx="0"/>
+            <a:endCxn id="26" idx="2"/>
+          </p:cNvCxnSpPr>
+          <p:nvPr/>
+        </p:nvCxnSpPr>
+        <p:spPr>
+          <a:xfrm flipH="1" flipV="1">
+            <a:off x="7204916" y="2045982"/>
+            <a:ext cx="158194" cy="2193674"/>
+          </a:xfrm>
+          <a:prstGeom prst="straightConnector1">
+            <a:avLst/>
+          </a:prstGeom>
+          <a:ln>
+            <a:tailEnd type="triangle"/>
+          </a:ln>
+        </p:spPr>
+        <p:style>
+          <a:lnRef idx="3">
+            <a:schemeClr val="dk1"/>
+          </a:lnRef>
+          <a:fillRef idx="0">
+            <a:schemeClr val="dk1"/>
+          </a:fillRef>
+          <a:effectRef idx="2">
+            <a:schemeClr val="dk1"/>
+          </a:effectRef>
+          <a:fontRef idx="minor">
+            <a:schemeClr val="tx1"/>
+          </a:fontRef>
+        </p:style>
+      </p:cxnSp>
+      <p:cxnSp>
+        <p:nvCxnSpPr>
+          <p:cNvPr id="39" name="直接箭头连接符 38">
+            <a:extLst>
+              <a:ext uri="{FF2B5EF4-FFF2-40B4-BE49-F238E27FC236}">
+                <a16:creationId xmlns:a16="http://schemas.microsoft.com/office/drawing/2014/main" id="{0315C9AE-F3FB-454C-837D-3E8F218677F7}"/>
+              </a:ext>
+            </a:extLst>
+          </p:cNvPr>
+          <p:cNvCxnSpPr>
+            <a:cxnSpLocks/>
+            <a:stCxn id="21" idx="0"/>
+            <a:endCxn id="29" idx="2"/>
+          </p:cNvCxnSpPr>
+          <p:nvPr/>
+        </p:nvCxnSpPr>
+        <p:spPr>
+          <a:xfrm flipH="1" flipV="1">
+            <a:off x="10414892" y="1752595"/>
+            <a:ext cx="224019" cy="2029861"/>
+          </a:xfrm>
+          <a:prstGeom prst="straightConnector1">
+            <a:avLst/>
+          </a:prstGeom>
+          <a:ln>
+            <a:tailEnd type="triangle"/>
+          </a:ln>
+        </p:spPr>
+        <p:style>
+          <a:lnRef idx="3">
+            <a:schemeClr val="dk1"/>
+          </a:lnRef>
+          <a:fillRef idx="0">
+            <a:schemeClr val="dk1"/>
+          </a:fillRef>
+          <a:effectRef idx="2">
+            <a:schemeClr val="dk1"/>
+          </a:effectRef>
+          <a:fontRef idx="minor">
+            <a:schemeClr val="tx1"/>
+          </a:fontRef>
+        </p:style>
+      </p:cxnSp>
+      <p:cxnSp>
+        <p:nvCxnSpPr>
+          <p:cNvPr id="42" name="直接箭头连接符 41">
+            <a:extLst>
+              <a:ext uri="{FF2B5EF4-FFF2-40B4-BE49-F238E27FC236}">
+                <a16:creationId xmlns:a16="http://schemas.microsoft.com/office/drawing/2014/main" id="{482FFE0D-A560-4715-9F95-916EEA436B46}"/>
+              </a:ext>
+            </a:extLst>
+          </p:cNvPr>
+          <p:cNvCxnSpPr>
+            <a:cxnSpLocks/>
+            <a:stCxn id="18" idx="0"/>
+            <a:endCxn id="27" idx="2"/>
+          </p:cNvCxnSpPr>
+          <p:nvPr/>
+        </p:nvCxnSpPr>
+        <p:spPr>
+          <a:xfrm flipH="1" flipV="1">
+            <a:off x="9179112" y="3136529"/>
+            <a:ext cx="32156" cy="1901519"/>
+          </a:xfrm>
+          <a:prstGeom prst="straightConnector1">
+            <a:avLst/>
+          </a:prstGeom>
+          <a:ln>
+            <a:tailEnd type="triangle"/>
+          </a:ln>
+        </p:spPr>
+        <p:style>
+          <a:lnRef idx="3">
+            <a:schemeClr val="dk1"/>
+          </a:lnRef>
+          <a:fillRef idx="0">
+            <a:schemeClr val="dk1"/>
+          </a:fillRef>
+          <a:effectRef idx="2">
+            <a:schemeClr val="dk1"/>
+          </a:effectRef>
+          <a:fontRef idx="minor">
+            <a:schemeClr val="tx1"/>
+          </a:fontRef>
+        </p:style>
+      </p:cxnSp>
+      <p:cxnSp>
+        <p:nvCxnSpPr>
+          <p:cNvPr id="46" name="直接箭头连接符 45">
+            <a:extLst>
+              <a:ext uri="{FF2B5EF4-FFF2-40B4-BE49-F238E27FC236}">
+                <a16:creationId xmlns:a16="http://schemas.microsoft.com/office/drawing/2014/main" id="{D049FBBC-AE22-4D84-A525-194906D9E940}"/>
+              </a:ext>
+            </a:extLst>
+          </p:cNvPr>
+          <p:cNvCxnSpPr>
+            <a:cxnSpLocks/>
+            <a:stCxn id="25" idx="0"/>
+            <a:endCxn id="27" idx="2"/>
+          </p:cNvCxnSpPr>
+          <p:nvPr/>
+        </p:nvCxnSpPr>
+        <p:spPr>
+          <a:xfrm flipV="1">
+            <a:off x="7363110" y="3136529"/>
+            <a:ext cx="1816002" cy="1103127"/>
+          </a:xfrm>
+          <a:prstGeom prst="straightConnector1">
+            <a:avLst/>
+          </a:prstGeom>
+          <a:ln>
+            <a:tailEnd type="triangle"/>
+          </a:ln>
+        </p:spPr>
+        <p:style>
+          <a:lnRef idx="3">
+            <a:schemeClr val="dk1"/>
+          </a:lnRef>
+          <a:fillRef idx="0">
+            <a:schemeClr val="dk1"/>
+          </a:fillRef>
+          <a:effectRef idx="2">
+            <a:schemeClr val="dk1"/>
+          </a:effectRef>
+          <a:fontRef idx="minor">
+            <a:schemeClr val="tx1"/>
+          </a:fontRef>
+        </p:style>
+      </p:cxnSp>
+      <p:cxnSp>
+        <p:nvCxnSpPr>
+          <p:cNvPr id="49" name="直接箭头连接符 48">
+            <a:extLst>
+              <a:ext uri="{FF2B5EF4-FFF2-40B4-BE49-F238E27FC236}">
+                <a16:creationId xmlns:a16="http://schemas.microsoft.com/office/drawing/2014/main" id="{D3F9DDCD-76D6-4966-B9BC-05FA84962359}"/>
+              </a:ext>
+            </a:extLst>
+          </p:cNvPr>
+          <p:cNvCxnSpPr>
+            <a:cxnSpLocks/>
+            <a:stCxn id="18" idx="0"/>
+            <a:endCxn id="26" idx="2"/>
+          </p:cNvCxnSpPr>
+          <p:nvPr/>
+        </p:nvCxnSpPr>
+        <p:spPr>
+          <a:xfrm flipH="1" flipV="1">
+            <a:off x="7204916" y="2045982"/>
+            <a:ext cx="2006352" cy="2992066"/>
+          </a:xfrm>
+          <a:prstGeom prst="straightConnector1">
+            <a:avLst/>
+          </a:prstGeom>
+          <a:ln>
+            <a:tailEnd type="triangle"/>
+          </a:ln>
+        </p:spPr>
+        <p:style>
+          <a:lnRef idx="3">
+            <a:schemeClr val="dk1"/>
+          </a:lnRef>
+          <a:fillRef idx="0">
+            <a:schemeClr val="dk1"/>
+          </a:fillRef>
+          <a:effectRef idx="2">
+            <a:schemeClr val="dk1"/>
+          </a:effectRef>
+          <a:fontRef idx="minor">
+            <a:schemeClr val="tx1"/>
+          </a:fontRef>
+        </p:style>
+      </p:cxnSp>
+      <p:sp>
+        <p:nvSpPr>
+          <p:cNvPr id="64" name="矩形 63">
+            <a:extLst>
+              <a:ext uri="{FF2B5EF4-FFF2-40B4-BE49-F238E27FC236}">
+                <a16:creationId xmlns:a16="http://schemas.microsoft.com/office/drawing/2014/main" id="{D84722CD-A223-4CA1-993A-3195D9FEEE10}"/>
+              </a:ext>
+            </a:extLst>
+          </p:cNvPr>
+          <p:cNvSpPr/>
+          <p:nvPr/>
+        </p:nvSpPr>
+        <p:spPr>
+          <a:xfrm>
+            <a:off x="1485900" y="3429000"/>
+            <a:ext cx="10153128" cy="3168352"/>
+          </a:xfrm>
+          <a:prstGeom prst="rect">
+            <a:avLst/>
+          </a:prstGeom>
+          <a:solidFill>
+            <a:schemeClr val="accent4">
+              <a:alpha val="20000"/>
+            </a:schemeClr>
+          </a:solidFill>
+        </p:spPr>
+        <p:style>
+          <a:lnRef idx="2">
+            <a:schemeClr val="accent4">
+              <a:shade val="50000"/>
+            </a:schemeClr>
+          </a:lnRef>
+          <a:fillRef idx="1">
+            <a:schemeClr val="accent4"/>
+          </a:fillRef>
+          <a:effectRef idx="0">
+            <a:schemeClr val="accent4"/>
+          </a:effectRef>
+          <a:fontRef idx="minor">
+            <a:schemeClr val="lt1"/>
+          </a:fontRef>
+        </p:style>
+        <p:txBody>
+          <a:bodyPr rtlCol="0" anchor="b"/>
+          <a:lstStyle/>
+          <a:p>
+            <a:r>
+              <a:rPr lang="zh-CN" altLang="en-US" dirty="0">
+                <a:solidFill>
+                  <a:schemeClr val="accent4"/>
+                </a:solidFill>
+              </a:rPr>
+              <a:t>建议学习</a:t>
+            </a:r>
+          </a:p>
+        </p:txBody>
+      </p:sp>
+    </p:spTree>
+    <p:extLst>
+      <p:ext uri="{BB962C8B-B14F-4D97-AF65-F5344CB8AC3E}">
+        <p14:creationId xmlns:p14="http://schemas.microsoft.com/office/powerpoint/2010/main" val="1261400912"/>
+      </p:ext>
+    </p:extLst>
+  </p:cSld>
+  <p:clrMapOvr>
+    <a:masterClrMapping/>
+  </p:clrMapOvr>
+  <mc:AlternateContent xmlns:mc="http://schemas.openxmlformats.org/markup-compatibility/2006">
+    <mc:Choice xmlns:p14="http://schemas.microsoft.com/office/powerpoint/2010/main" Requires="p14">
+      <p:transition spd="med" p14:dur="700">
+        <p:fade/>
+      </p:transition>
+    </mc:Choice>
+    <mc:Fallback>
+      <p:transition spd="med">
+        <p:fade/>
+      </p:transition>
+    </mc:Fallback>
+  </mc:AlternateContent>
+  <p:timing>
+    <p:tnLst>
+      <p:par>
+        <p:cTn id="1" dur="indefinite" restart="never" nodeType="tmRoot">
+          <p:childTnLst>
+            <p:seq concurrent="1" nextAc="seek">
+              <p:cTn id="2" dur="indefinite" nodeType="mainSeq">
+                <p:childTnLst>
+                  <p:par>
+                    <p:cTn id="3" fill="hold">
+                      <p:stCondLst>
+                        <p:cond delay="indefinite"/>
+                      </p:stCondLst>
+                      <p:childTnLst>
+                        <p:par>
+                          <p:cTn id="4" fill="hold">
+                            <p:stCondLst>
+                              <p:cond delay="0"/>
+                            </p:stCondLst>
+                            <p:childTnLst>
+                              <p:par>
+                                <p:cTn id="5" presetID="16" presetClass="entr" presetSubtype="21" fill="hold" grpId="0" nodeType="clickEffect">
+                                  <p:stCondLst>
+                                    <p:cond delay="0"/>
+                                  </p:stCondLst>
+                                  <p:childTnLst>
+                                    <p:set>
+                                      <p:cBhvr>
+                                        <p:cTn id="6" dur="1" fill="hold">
+                                          <p:stCondLst>
+                                            <p:cond delay="0"/>
+                                          </p:stCondLst>
+                                        </p:cTn>
+                                        <p:tgtEl>
+                                          <p:spTgt spid="64"/>
+                                        </p:tgtEl>
+                                        <p:attrNameLst>
+                                          <p:attrName>style.visibility</p:attrName>
+                                        </p:attrNameLst>
+                                      </p:cBhvr>
+                                      <p:to>
+                                        <p:strVal val="visible"/>
+                                      </p:to>
+                                    </p:set>
+                                    <p:animEffect transition="in" filter="barn(inVertical)">
+                                      <p:cBhvr>
+                                        <p:cTn id="7" dur="500"/>
+                                        <p:tgtEl>
+                                          <p:spTgt spid="64"/>
+                                        </p:tgtEl>
+                                      </p:cBhvr>
+                                    </p:animEffect>
+                                  </p:childTnLst>
+                                </p:cTn>
+                              </p:par>
+                            </p:childTnLst>
+                          </p:cTn>
+                        </p:par>
+                      </p:childTnLst>
+                    </p:cTn>
+                  </p:par>
+                </p:childTnLst>
+              </p:cTn>
+              <p:prevCondLst>
+                <p:cond evt="onPrev" delay="0">
+                  <p:tgtEl>
+                    <p:sldTgt/>
+                  </p:tgtEl>
+                </p:cond>
+              </p:prevCondLst>
+              <p:nextCondLst>
+                <p:cond evt="onNext" delay="0">
+                  <p:tgtEl>
+                    <p:sldTgt/>
+                  </p:tgtEl>
+                </p:cond>
+              </p:nextCondLst>
+            </p:seq>
+          </p:childTnLst>
+        </p:cTn>
+      </p:par>
+    </p:tnLst>
+    <p:bldLst>
+      <p:bldP spid="64" grpId="0" animBg="1"/>
+    </p:bldLst>
+  </p:timing>
 </p:sld>
 </file>
 
@@ -22401,6 +23255,2270 @@
 </p:sld>
 </file>
 
+<file path=ppt/slides/slide20.xml><?xml version="1.0" encoding="utf-8"?>
+<p:sld xmlns:a="http://schemas.openxmlformats.org/drawingml/2006/main" xmlns:r="http://schemas.openxmlformats.org/officeDocument/2006/relationships" xmlns:p="http://schemas.openxmlformats.org/presentationml/2006/main">
+  <p:cSld>
+    <p:spTree>
+      <p:nvGrpSpPr>
+        <p:cNvPr id="1" name=""/>
+        <p:cNvGrpSpPr/>
+        <p:nvPr/>
+      </p:nvGrpSpPr>
+      <p:grpSpPr>
+        <a:xfrm>
+          <a:off x="0" y="0"/>
+          <a:ext cx="0" cy="0"/>
+          <a:chOff x="0" y="0"/>
+          <a:chExt cx="0" cy="0"/>
+        </a:xfrm>
+      </p:grpSpPr>
+      <p:sp>
+        <p:nvSpPr>
+          <p:cNvPr id="137" name="矩形 136">
+            <a:extLst>
+              <a:ext uri="{FF2B5EF4-FFF2-40B4-BE49-F238E27FC236}">
+                <a16:creationId xmlns:a16="http://schemas.microsoft.com/office/drawing/2014/main" id="{49552789-7492-4D0A-9FF8-2BD2F6B432AF}"/>
+              </a:ext>
+            </a:extLst>
+          </p:cNvPr>
+          <p:cNvSpPr/>
+          <p:nvPr/>
+        </p:nvSpPr>
+        <p:spPr>
+          <a:xfrm>
+            <a:off x="6742485" y="1196753"/>
+            <a:ext cx="3261170" cy="3177418"/>
+          </a:xfrm>
+          <a:prstGeom prst="rect">
+            <a:avLst/>
+          </a:prstGeom>
+          <a:solidFill>
+            <a:schemeClr val="accent5">
+              <a:alpha val="20000"/>
+            </a:schemeClr>
+          </a:solidFill>
+        </p:spPr>
+        <p:style>
+          <a:lnRef idx="2">
+            <a:schemeClr val="accent5"/>
+          </a:lnRef>
+          <a:fillRef idx="1">
+            <a:schemeClr val="lt1"/>
+          </a:fillRef>
+          <a:effectRef idx="0">
+            <a:schemeClr val="accent5"/>
+          </a:effectRef>
+          <a:fontRef idx="minor">
+            <a:schemeClr val="dk1"/>
+          </a:fontRef>
+        </p:style>
+        <p:txBody>
+          <a:bodyPr rtlCol="0" anchor="t"/>
+          <a:lstStyle/>
+          <a:p>
+            <a:r>
+              <a:rPr lang="en-US" altLang="zh-CN" dirty="0">
+                <a:solidFill>
+                  <a:schemeClr val="accent5"/>
+                </a:solidFill>
+              </a:rPr>
+              <a:t>SLAM</a:t>
+            </a:r>
+            <a:r>
+              <a:rPr lang="zh-CN" altLang="en-US" dirty="0">
+                <a:solidFill>
+                  <a:schemeClr val="accent5"/>
+                </a:solidFill>
+              </a:rPr>
+              <a:t>视觉</a:t>
+            </a:r>
+          </a:p>
+        </p:txBody>
+      </p:sp>
+      <p:sp>
+        <p:nvSpPr>
+          <p:cNvPr id="136" name="矩形 135">
+            <a:extLst>
+              <a:ext uri="{FF2B5EF4-FFF2-40B4-BE49-F238E27FC236}">
+                <a16:creationId xmlns:a16="http://schemas.microsoft.com/office/drawing/2014/main" id="{0BF30B3E-760C-46D9-BF90-5944B010D9C6}"/>
+              </a:ext>
+            </a:extLst>
+          </p:cNvPr>
+          <p:cNvSpPr/>
+          <p:nvPr/>
+        </p:nvSpPr>
+        <p:spPr>
+          <a:xfrm>
+            <a:off x="6612059" y="4974226"/>
+            <a:ext cx="3391596" cy="1623126"/>
+          </a:xfrm>
+          <a:prstGeom prst="rect">
+            <a:avLst/>
+          </a:prstGeom>
+          <a:solidFill>
+            <a:schemeClr val="accent4">
+              <a:alpha val="20000"/>
+            </a:schemeClr>
+          </a:solidFill>
+        </p:spPr>
+        <p:style>
+          <a:lnRef idx="2">
+            <a:schemeClr val="accent4">
+              <a:shade val="50000"/>
+            </a:schemeClr>
+          </a:lnRef>
+          <a:fillRef idx="1">
+            <a:schemeClr val="accent4"/>
+          </a:fillRef>
+          <a:effectRef idx="0">
+            <a:schemeClr val="accent4"/>
+          </a:effectRef>
+          <a:fontRef idx="minor">
+            <a:schemeClr val="lt1"/>
+          </a:fontRef>
+        </p:style>
+        <p:txBody>
+          <a:bodyPr rtlCol="0" anchor="b"/>
+          <a:lstStyle/>
+          <a:p>
+            <a:endParaRPr lang="zh-CN" altLang="en-US" dirty="0">
+              <a:solidFill>
+                <a:schemeClr val="accent4"/>
+              </a:solidFill>
+            </a:endParaRPr>
+          </a:p>
+        </p:txBody>
+      </p:sp>
+      <p:sp>
+        <p:nvSpPr>
+          <p:cNvPr id="135" name="矩形 134">
+            <a:extLst>
+              <a:ext uri="{FF2B5EF4-FFF2-40B4-BE49-F238E27FC236}">
+                <a16:creationId xmlns:a16="http://schemas.microsoft.com/office/drawing/2014/main" id="{6E71055B-0BF9-4444-9016-D21F75A5AE29}"/>
+              </a:ext>
+            </a:extLst>
+          </p:cNvPr>
+          <p:cNvSpPr/>
+          <p:nvPr/>
+        </p:nvSpPr>
+        <p:spPr>
+          <a:xfrm>
+            <a:off x="1341884" y="1196752"/>
+            <a:ext cx="5270175" cy="5400600"/>
+          </a:xfrm>
+          <a:prstGeom prst="rect">
+            <a:avLst/>
+          </a:prstGeom>
+          <a:solidFill>
+            <a:schemeClr val="accent4">
+              <a:alpha val="20000"/>
+            </a:schemeClr>
+          </a:solidFill>
+        </p:spPr>
+        <p:style>
+          <a:lnRef idx="2">
+            <a:schemeClr val="accent4">
+              <a:shade val="50000"/>
+            </a:schemeClr>
+          </a:lnRef>
+          <a:fillRef idx="1">
+            <a:schemeClr val="accent4"/>
+          </a:fillRef>
+          <a:effectRef idx="0">
+            <a:schemeClr val="accent4"/>
+          </a:effectRef>
+          <a:fontRef idx="minor">
+            <a:schemeClr val="lt1"/>
+          </a:fontRef>
+        </p:style>
+        <p:txBody>
+          <a:bodyPr rtlCol="0" anchor="t"/>
+          <a:lstStyle/>
+          <a:p>
+            <a:r>
+              <a:rPr lang="zh-CN" altLang="en-US" dirty="0">
+                <a:solidFill>
+                  <a:schemeClr val="accent4"/>
+                </a:solidFill>
+              </a:rPr>
+              <a:t>基本必学</a:t>
+            </a:r>
+          </a:p>
+        </p:txBody>
+      </p:sp>
+      <p:sp>
+        <p:nvSpPr>
+          <p:cNvPr id="2" name="标题 1">
+            <a:extLst>
+              <a:ext uri="{FF2B5EF4-FFF2-40B4-BE49-F238E27FC236}">
+                <a16:creationId xmlns:a16="http://schemas.microsoft.com/office/drawing/2014/main" id="{F6FBF821-1EBB-4608-A353-34065F24C6C6}"/>
+              </a:ext>
+            </a:extLst>
+          </p:cNvPr>
+          <p:cNvSpPr>
+            <a:spLocks noGrp="1"/>
+          </p:cNvSpPr>
+          <p:nvPr>
+            <p:ph type="title"/>
+          </p:nvPr>
+        </p:nvSpPr>
+        <p:spPr>
+          <a:xfrm>
+            <a:off x="1593436" y="177801"/>
+            <a:ext cx="9782801" cy="874936"/>
+          </a:xfrm>
+        </p:spPr>
+        <p:txBody>
+          <a:bodyPr/>
+          <a:lstStyle/>
+          <a:p>
+            <a:r>
+              <a:rPr lang="zh-CN" altLang="en-US" dirty="0">
+                <a:latin typeface="Arial" panose="020B0604020202020204" pitchFamily="34" charset="0"/>
+                <a:sym typeface="Arial" panose="020B0604020202020204" pitchFamily="34" charset="0"/>
+              </a:rPr>
+              <a:t>数据科学人员</a:t>
+            </a:r>
+            <a:endParaRPr lang="zh-CN" altLang="en-US" dirty="0"/>
+          </a:p>
+        </p:txBody>
+      </p:sp>
+      <p:sp>
+        <p:nvSpPr>
+          <p:cNvPr id="6" name="矩形 5">
+            <a:extLst>
+              <a:ext uri="{FF2B5EF4-FFF2-40B4-BE49-F238E27FC236}">
+                <a16:creationId xmlns:a16="http://schemas.microsoft.com/office/drawing/2014/main" id="{A924A93B-9AC9-46A6-B3C2-EE1041ABC58F}"/>
+              </a:ext>
+            </a:extLst>
+          </p:cNvPr>
+          <p:cNvSpPr/>
+          <p:nvPr/>
+        </p:nvSpPr>
+        <p:spPr>
+          <a:xfrm>
+            <a:off x="4582244" y="5393237"/>
+            <a:ext cx="1440160" cy="684076"/>
+          </a:xfrm>
+          <a:prstGeom prst="rect">
+            <a:avLst/>
+          </a:prstGeom>
+        </p:spPr>
+        <p:style>
+          <a:lnRef idx="2">
+            <a:schemeClr val="accent2">
+              <a:shade val="50000"/>
+            </a:schemeClr>
+          </a:lnRef>
+          <a:fillRef idx="1">
+            <a:schemeClr val="accent2"/>
+          </a:fillRef>
+          <a:effectRef idx="0">
+            <a:schemeClr val="accent2"/>
+          </a:effectRef>
+          <a:fontRef idx="minor">
+            <a:schemeClr val="lt1"/>
+          </a:fontRef>
+        </p:style>
+        <p:txBody>
+          <a:bodyPr rtlCol="0" anchor="ctr"/>
+          <a:lstStyle/>
+          <a:p>
+            <a:pPr algn="ctr"/>
+            <a:r>
+              <a:rPr lang="zh-CN" altLang="en-US" dirty="0"/>
+              <a:t>线性代数</a:t>
+            </a:r>
+            <a:endParaRPr lang="en-US" altLang="zh-CN" dirty="0"/>
+          </a:p>
+          <a:p>
+            <a:pPr algn="ctr"/>
+            <a:r>
+              <a:rPr lang="zh-CN" altLang="en-US" dirty="0"/>
+              <a:t>（</a:t>
+            </a:r>
+            <a:r>
+              <a:rPr lang="en-US" altLang="zh-CN" dirty="0"/>
+              <a:t>-</a:t>
+            </a:r>
+            <a:r>
+              <a:rPr lang="zh-CN" altLang="en-US" dirty="0"/>
+              <a:t>多项式）</a:t>
+            </a:r>
+          </a:p>
+        </p:txBody>
+      </p:sp>
+      <p:sp>
+        <p:nvSpPr>
+          <p:cNvPr id="26" name="矩形 25">
+            <a:extLst>
+              <a:ext uri="{FF2B5EF4-FFF2-40B4-BE49-F238E27FC236}">
+                <a16:creationId xmlns:a16="http://schemas.microsoft.com/office/drawing/2014/main" id="{6F9DB88A-3812-4F56-B99B-794ABB907225}"/>
+              </a:ext>
+            </a:extLst>
+          </p:cNvPr>
+          <p:cNvSpPr/>
+          <p:nvPr/>
+        </p:nvSpPr>
+        <p:spPr>
+          <a:xfrm>
+            <a:off x="7678588" y="5382283"/>
+            <a:ext cx="1440160" cy="684076"/>
+          </a:xfrm>
+          <a:prstGeom prst="rect">
+            <a:avLst/>
+          </a:prstGeom>
+        </p:spPr>
+        <p:style>
+          <a:lnRef idx="2">
+            <a:schemeClr val="accent2">
+              <a:shade val="50000"/>
+            </a:schemeClr>
+          </a:lnRef>
+          <a:fillRef idx="1">
+            <a:schemeClr val="accent2"/>
+          </a:fillRef>
+          <a:effectRef idx="0">
+            <a:schemeClr val="accent2"/>
+          </a:effectRef>
+          <a:fontRef idx="minor">
+            <a:schemeClr val="lt1"/>
+          </a:fontRef>
+        </p:style>
+        <p:txBody>
+          <a:bodyPr rtlCol="0" anchor="ctr"/>
+          <a:lstStyle/>
+          <a:p>
+            <a:pPr algn="ctr"/>
+            <a:r>
+              <a:rPr lang="zh-CN" altLang="en-US" dirty="0"/>
+              <a:t>抽象代数</a:t>
+            </a:r>
+            <a:endParaRPr lang="en-US" altLang="zh-CN" dirty="0"/>
+          </a:p>
+          <a:p>
+            <a:pPr algn="ctr"/>
+            <a:r>
+              <a:rPr lang="zh-CN" altLang="en-US" dirty="0"/>
+              <a:t>（群论）</a:t>
+            </a:r>
+          </a:p>
+        </p:txBody>
+      </p:sp>
+      <p:sp>
+        <p:nvSpPr>
+          <p:cNvPr id="28" name="矩形 27">
+            <a:extLst>
+              <a:ext uri="{FF2B5EF4-FFF2-40B4-BE49-F238E27FC236}">
+                <a16:creationId xmlns:a16="http://schemas.microsoft.com/office/drawing/2014/main" id="{F931A6D4-35D3-412A-ADC4-60815755109D}"/>
+              </a:ext>
+            </a:extLst>
+          </p:cNvPr>
+          <p:cNvSpPr/>
+          <p:nvPr/>
+        </p:nvSpPr>
+        <p:spPr>
+          <a:xfrm>
+            <a:off x="2926060" y="5393237"/>
+            <a:ext cx="1440160" cy="684076"/>
+          </a:xfrm>
+          <a:prstGeom prst="rect">
+            <a:avLst/>
+          </a:prstGeom>
+        </p:spPr>
+        <p:style>
+          <a:lnRef idx="2">
+            <a:schemeClr val="accent2">
+              <a:shade val="50000"/>
+            </a:schemeClr>
+          </a:lnRef>
+          <a:fillRef idx="1">
+            <a:schemeClr val="accent2"/>
+          </a:fillRef>
+          <a:effectRef idx="0">
+            <a:schemeClr val="accent2"/>
+          </a:effectRef>
+          <a:fontRef idx="minor">
+            <a:schemeClr val="lt1"/>
+          </a:fontRef>
+        </p:style>
+        <p:txBody>
+          <a:bodyPr rtlCol="0" anchor="ctr"/>
+          <a:lstStyle/>
+          <a:p>
+            <a:pPr algn="ctr"/>
+            <a:r>
+              <a:rPr lang="zh-CN" altLang="en-US" dirty="0"/>
+              <a:t>分析数学</a:t>
+            </a:r>
+            <a:endParaRPr lang="en-US" altLang="zh-CN" dirty="0"/>
+          </a:p>
+          <a:p>
+            <a:pPr algn="ctr"/>
+            <a:r>
+              <a:rPr lang="zh-CN" altLang="en-US" dirty="0"/>
+              <a:t>（微积分）</a:t>
+            </a:r>
+          </a:p>
+        </p:txBody>
+      </p:sp>
+      <p:sp>
+        <p:nvSpPr>
+          <p:cNvPr id="29" name="矩形 28">
+            <a:extLst>
+              <a:ext uri="{FF2B5EF4-FFF2-40B4-BE49-F238E27FC236}">
+                <a16:creationId xmlns:a16="http://schemas.microsoft.com/office/drawing/2014/main" id="{41C66AB7-640F-4693-86FE-FD46E15BEDA8}"/>
+              </a:ext>
+            </a:extLst>
+          </p:cNvPr>
+          <p:cNvSpPr/>
+          <p:nvPr/>
+        </p:nvSpPr>
+        <p:spPr>
+          <a:xfrm>
+            <a:off x="8433069" y="3330054"/>
+            <a:ext cx="1440160" cy="684076"/>
+          </a:xfrm>
+          <a:prstGeom prst="rect">
+            <a:avLst/>
+          </a:prstGeom>
+        </p:spPr>
+        <p:style>
+          <a:lnRef idx="2">
+            <a:schemeClr val="accent2">
+              <a:shade val="50000"/>
+            </a:schemeClr>
+          </a:lnRef>
+          <a:fillRef idx="1">
+            <a:schemeClr val="accent2"/>
+          </a:fillRef>
+          <a:effectRef idx="0">
+            <a:schemeClr val="accent2"/>
+          </a:effectRef>
+          <a:fontRef idx="minor">
+            <a:schemeClr val="lt1"/>
+          </a:fontRef>
+        </p:style>
+        <p:txBody>
+          <a:bodyPr rtlCol="0" anchor="ctr"/>
+          <a:lstStyle/>
+          <a:p>
+            <a:pPr algn="ctr"/>
+            <a:r>
+              <a:rPr lang="zh-CN" altLang="en-US" dirty="0"/>
+              <a:t>拓扑学</a:t>
+            </a:r>
+          </a:p>
+        </p:txBody>
+      </p:sp>
+      <p:sp>
+        <p:nvSpPr>
+          <p:cNvPr id="24" name="矩形 23">
+            <a:extLst>
+              <a:ext uri="{FF2B5EF4-FFF2-40B4-BE49-F238E27FC236}">
+                <a16:creationId xmlns:a16="http://schemas.microsoft.com/office/drawing/2014/main" id="{B04B35EC-8153-4E9C-8531-41912C8CA37F}"/>
+              </a:ext>
+            </a:extLst>
+          </p:cNvPr>
+          <p:cNvSpPr/>
+          <p:nvPr/>
+        </p:nvSpPr>
+        <p:spPr>
+          <a:xfrm>
+            <a:off x="2277988" y="3330055"/>
+            <a:ext cx="1440160" cy="684076"/>
+          </a:xfrm>
+          <a:prstGeom prst="rect">
+            <a:avLst/>
+          </a:prstGeom>
+        </p:spPr>
+        <p:style>
+          <a:lnRef idx="2">
+            <a:schemeClr val="accent2">
+              <a:shade val="50000"/>
+            </a:schemeClr>
+          </a:lnRef>
+          <a:fillRef idx="1">
+            <a:schemeClr val="accent2"/>
+          </a:fillRef>
+          <a:effectRef idx="0">
+            <a:schemeClr val="accent2"/>
+          </a:effectRef>
+          <a:fontRef idx="minor">
+            <a:schemeClr val="lt1"/>
+          </a:fontRef>
+        </p:style>
+        <p:txBody>
+          <a:bodyPr rtlCol="0" anchor="ctr"/>
+          <a:lstStyle/>
+          <a:p>
+            <a:pPr algn="ctr"/>
+            <a:r>
+              <a:rPr lang="zh-CN" altLang="en-US" dirty="0"/>
+              <a:t>概率论</a:t>
+            </a:r>
+          </a:p>
+        </p:txBody>
+      </p:sp>
+      <p:sp>
+        <p:nvSpPr>
+          <p:cNvPr id="35" name="矩形 34">
+            <a:extLst>
+              <a:ext uri="{FF2B5EF4-FFF2-40B4-BE49-F238E27FC236}">
+                <a16:creationId xmlns:a16="http://schemas.microsoft.com/office/drawing/2014/main" id="{38FB8083-8A9E-4D8B-83F3-9F24A86F0FED}"/>
+              </a:ext>
+            </a:extLst>
+          </p:cNvPr>
+          <p:cNvSpPr/>
+          <p:nvPr/>
+        </p:nvSpPr>
+        <p:spPr>
+          <a:xfrm>
+            <a:off x="1680400" y="1716792"/>
+            <a:ext cx="1440160" cy="684076"/>
+          </a:xfrm>
+          <a:prstGeom prst="rect">
+            <a:avLst/>
+          </a:prstGeom>
+        </p:spPr>
+        <p:style>
+          <a:lnRef idx="2">
+            <a:schemeClr val="accent2">
+              <a:shade val="50000"/>
+            </a:schemeClr>
+          </a:lnRef>
+          <a:fillRef idx="1">
+            <a:schemeClr val="accent2"/>
+          </a:fillRef>
+          <a:effectRef idx="0">
+            <a:schemeClr val="accent2"/>
+          </a:effectRef>
+          <a:fontRef idx="minor">
+            <a:schemeClr val="lt1"/>
+          </a:fontRef>
+        </p:style>
+        <p:txBody>
+          <a:bodyPr rtlCol="0" anchor="ctr"/>
+          <a:lstStyle/>
+          <a:p>
+            <a:pPr algn="ctr"/>
+            <a:r>
+              <a:rPr lang="zh-CN" altLang="en-US" dirty="0"/>
+              <a:t>信息论</a:t>
+            </a:r>
+          </a:p>
+        </p:txBody>
+      </p:sp>
+      <p:sp>
+        <p:nvSpPr>
+          <p:cNvPr id="37" name="矩形 36">
+            <a:extLst>
+              <a:ext uri="{FF2B5EF4-FFF2-40B4-BE49-F238E27FC236}">
+                <a16:creationId xmlns:a16="http://schemas.microsoft.com/office/drawing/2014/main" id="{D593A7BA-FE57-493A-B49F-5A553E40FDE8}"/>
+              </a:ext>
+            </a:extLst>
+          </p:cNvPr>
+          <p:cNvSpPr/>
+          <p:nvPr/>
+        </p:nvSpPr>
+        <p:spPr>
+          <a:xfrm>
+            <a:off x="10198868" y="4014131"/>
+            <a:ext cx="1440160" cy="2583222"/>
+          </a:xfrm>
+          <a:prstGeom prst="rect">
+            <a:avLst/>
+          </a:prstGeom>
+        </p:spPr>
+        <p:style>
+          <a:lnRef idx="2">
+            <a:schemeClr val="accent3">
+              <a:shade val="50000"/>
+            </a:schemeClr>
+          </a:lnRef>
+          <a:fillRef idx="1">
+            <a:schemeClr val="accent3"/>
+          </a:fillRef>
+          <a:effectRef idx="0">
+            <a:schemeClr val="accent3"/>
+          </a:effectRef>
+          <a:fontRef idx="minor">
+            <a:schemeClr val="lt1"/>
+          </a:fontRef>
+        </p:style>
+        <p:txBody>
+          <a:bodyPr rtlCol="0" anchor="ctr"/>
+          <a:lstStyle/>
+          <a:p>
+            <a:pPr algn="ctr"/>
+            <a:r>
+              <a:rPr lang="zh-CN" altLang="en-US" dirty="0"/>
+              <a:t>数值计算</a:t>
+            </a:r>
+            <a:endParaRPr lang="en-US" altLang="zh-CN" dirty="0"/>
+          </a:p>
+          <a:p>
+            <a:pPr algn="ctr"/>
+            <a:endParaRPr lang="en-US" altLang="zh-CN" dirty="0"/>
+          </a:p>
+          <a:p>
+            <a:pPr algn="ctr"/>
+            <a:r>
+              <a:rPr lang="zh-CN" altLang="en-US" dirty="0"/>
+              <a:t>平台优化</a:t>
+            </a:r>
+            <a:endParaRPr lang="en-US" altLang="zh-CN" dirty="0"/>
+          </a:p>
+          <a:p>
+            <a:pPr algn="ctr"/>
+            <a:r>
+              <a:rPr lang="zh-CN" altLang="en-US" dirty="0"/>
+              <a:t>芯片开发</a:t>
+            </a:r>
+          </a:p>
+        </p:txBody>
+      </p:sp>
+      <p:sp>
+        <p:nvSpPr>
+          <p:cNvPr id="38" name="矩形 37">
+            <a:extLst>
+              <a:ext uri="{FF2B5EF4-FFF2-40B4-BE49-F238E27FC236}">
+                <a16:creationId xmlns:a16="http://schemas.microsoft.com/office/drawing/2014/main" id="{2E62200D-3813-4240-AD7A-522B1B41075A}"/>
+              </a:ext>
+            </a:extLst>
+          </p:cNvPr>
+          <p:cNvSpPr/>
+          <p:nvPr/>
+        </p:nvSpPr>
+        <p:spPr>
+          <a:xfrm>
+            <a:off x="5014292" y="1716792"/>
+            <a:ext cx="1440160" cy="684076"/>
+          </a:xfrm>
+          <a:prstGeom prst="rect">
+            <a:avLst/>
+          </a:prstGeom>
+        </p:spPr>
+        <p:style>
+          <a:lnRef idx="2">
+            <a:schemeClr val="accent2">
+              <a:shade val="50000"/>
+            </a:schemeClr>
+          </a:lnRef>
+          <a:fillRef idx="1">
+            <a:schemeClr val="accent2"/>
+          </a:fillRef>
+          <a:effectRef idx="0">
+            <a:schemeClr val="accent2"/>
+          </a:effectRef>
+          <a:fontRef idx="minor">
+            <a:schemeClr val="lt1"/>
+          </a:fontRef>
+        </p:style>
+        <p:txBody>
+          <a:bodyPr rtlCol="0" anchor="ctr"/>
+          <a:lstStyle/>
+          <a:p>
+            <a:pPr algn="ctr"/>
+            <a:r>
+              <a:rPr lang="zh-CN" altLang="en-US" dirty="0"/>
+              <a:t>凸优化及</a:t>
+            </a:r>
+            <a:endParaRPr lang="en-US" altLang="zh-CN" dirty="0"/>
+          </a:p>
+          <a:p>
+            <a:pPr algn="ctr"/>
+            <a:r>
+              <a:rPr lang="zh-CN" altLang="en-US" dirty="0"/>
+              <a:t>优化理论</a:t>
+            </a:r>
+          </a:p>
+        </p:txBody>
+      </p:sp>
+      <p:sp>
+        <p:nvSpPr>
+          <p:cNvPr id="40" name="矩形 39">
+            <a:extLst>
+              <a:ext uri="{FF2B5EF4-FFF2-40B4-BE49-F238E27FC236}">
+                <a16:creationId xmlns:a16="http://schemas.microsoft.com/office/drawing/2014/main" id="{87D823B1-0138-4982-A42C-0DACDE84E82F}"/>
+              </a:ext>
+            </a:extLst>
+          </p:cNvPr>
+          <p:cNvSpPr/>
+          <p:nvPr/>
+        </p:nvSpPr>
+        <p:spPr>
+          <a:xfrm>
+            <a:off x="7678588" y="1716792"/>
+            <a:ext cx="1440160" cy="684076"/>
+          </a:xfrm>
+          <a:prstGeom prst="rect">
+            <a:avLst/>
+          </a:prstGeom>
+        </p:spPr>
+        <p:style>
+          <a:lnRef idx="2">
+            <a:schemeClr val="accent2">
+              <a:shade val="50000"/>
+            </a:schemeClr>
+          </a:lnRef>
+          <a:fillRef idx="1">
+            <a:schemeClr val="accent2"/>
+          </a:fillRef>
+          <a:effectRef idx="0">
+            <a:schemeClr val="accent2"/>
+          </a:effectRef>
+          <a:fontRef idx="minor">
+            <a:schemeClr val="lt1"/>
+          </a:fontRef>
+        </p:style>
+        <p:txBody>
+          <a:bodyPr rtlCol="0" anchor="ctr"/>
+          <a:lstStyle/>
+          <a:p>
+            <a:pPr algn="ctr"/>
+            <a:r>
+              <a:rPr lang="zh-CN" altLang="en-US" dirty="0"/>
+              <a:t>李群</a:t>
+            </a:r>
+            <a:endParaRPr lang="en-US" altLang="zh-CN" dirty="0"/>
+          </a:p>
+          <a:p>
+            <a:pPr algn="ctr"/>
+            <a:r>
+              <a:rPr lang="zh-CN" altLang="en-US" dirty="0"/>
+              <a:t>李代数</a:t>
+            </a:r>
+          </a:p>
+        </p:txBody>
+      </p:sp>
+      <p:sp>
+        <p:nvSpPr>
+          <p:cNvPr id="43" name="矩形 42">
+            <a:extLst>
+              <a:ext uri="{FF2B5EF4-FFF2-40B4-BE49-F238E27FC236}">
+                <a16:creationId xmlns:a16="http://schemas.microsoft.com/office/drawing/2014/main" id="{080DBFA9-8751-4497-8350-8994DBE0B87C}"/>
+              </a:ext>
+            </a:extLst>
+          </p:cNvPr>
+          <p:cNvSpPr/>
+          <p:nvPr/>
+        </p:nvSpPr>
+        <p:spPr>
+          <a:xfrm>
+            <a:off x="3358108" y="1716792"/>
+            <a:ext cx="1440160" cy="684076"/>
+          </a:xfrm>
+          <a:prstGeom prst="rect">
+            <a:avLst/>
+          </a:prstGeom>
+        </p:spPr>
+        <p:style>
+          <a:lnRef idx="2">
+            <a:schemeClr val="accent2">
+              <a:shade val="50000"/>
+            </a:schemeClr>
+          </a:lnRef>
+          <a:fillRef idx="1">
+            <a:schemeClr val="accent2"/>
+          </a:fillRef>
+          <a:effectRef idx="0">
+            <a:schemeClr val="accent2"/>
+          </a:effectRef>
+          <a:fontRef idx="minor">
+            <a:schemeClr val="lt1"/>
+          </a:fontRef>
+        </p:style>
+        <p:txBody>
+          <a:bodyPr rtlCol="0" anchor="ctr"/>
+          <a:lstStyle/>
+          <a:p>
+            <a:pPr algn="ctr"/>
+            <a:r>
+              <a:rPr lang="zh-CN" altLang="en-US" dirty="0"/>
+              <a:t>随机过程</a:t>
+            </a:r>
+            <a:endParaRPr lang="en-US" altLang="zh-CN" dirty="0"/>
+          </a:p>
+          <a:p>
+            <a:pPr algn="ctr"/>
+            <a:r>
+              <a:rPr lang="zh-CN" altLang="en-US" dirty="0"/>
+              <a:t>（</a:t>
+            </a:r>
+            <a:r>
+              <a:rPr lang="en-US" altLang="zh-CN" dirty="0"/>
+              <a:t>+</a:t>
+            </a:r>
+            <a:r>
+              <a:rPr lang="zh-CN" altLang="en-US" dirty="0"/>
+              <a:t>金融）</a:t>
+            </a:r>
+          </a:p>
+        </p:txBody>
+      </p:sp>
+      <p:cxnSp>
+        <p:nvCxnSpPr>
+          <p:cNvPr id="44" name="直接箭头连接符 43">
+            <a:extLst>
+              <a:ext uri="{FF2B5EF4-FFF2-40B4-BE49-F238E27FC236}">
+                <a16:creationId xmlns:a16="http://schemas.microsoft.com/office/drawing/2014/main" id="{FFFE47B3-9667-41C3-BFC7-D4D9559EA739}"/>
+              </a:ext>
+            </a:extLst>
+          </p:cNvPr>
+          <p:cNvCxnSpPr>
+            <a:cxnSpLocks/>
+            <a:stCxn id="28" idx="0"/>
+            <a:endCxn id="24" idx="2"/>
+          </p:cNvCxnSpPr>
+          <p:nvPr/>
+        </p:nvCxnSpPr>
+        <p:spPr>
+          <a:xfrm flipH="1" flipV="1">
+            <a:off x="2998068" y="4014131"/>
+            <a:ext cx="648072" cy="1379106"/>
+          </a:xfrm>
+          <a:prstGeom prst="straightConnector1">
+            <a:avLst/>
+          </a:prstGeom>
+          <a:ln>
+            <a:tailEnd type="triangle"/>
+          </a:ln>
+        </p:spPr>
+        <p:style>
+          <a:lnRef idx="3">
+            <a:schemeClr val="dk1"/>
+          </a:lnRef>
+          <a:fillRef idx="0">
+            <a:schemeClr val="dk1"/>
+          </a:fillRef>
+          <a:effectRef idx="2">
+            <a:schemeClr val="dk1"/>
+          </a:effectRef>
+          <a:fontRef idx="minor">
+            <a:schemeClr val="tx1"/>
+          </a:fontRef>
+        </p:style>
+      </p:cxnSp>
+      <p:cxnSp>
+        <p:nvCxnSpPr>
+          <p:cNvPr id="45" name="直接箭头连接符 44">
+            <a:extLst>
+              <a:ext uri="{FF2B5EF4-FFF2-40B4-BE49-F238E27FC236}">
+                <a16:creationId xmlns:a16="http://schemas.microsoft.com/office/drawing/2014/main" id="{D7AD5D9A-ED33-45F9-B5D2-97EE24CAF64F}"/>
+              </a:ext>
+            </a:extLst>
+          </p:cNvPr>
+          <p:cNvCxnSpPr>
+            <a:cxnSpLocks/>
+            <a:stCxn id="24" idx="0"/>
+            <a:endCxn id="43" idx="2"/>
+          </p:cNvCxnSpPr>
+          <p:nvPr/>
+        </p:nvCxnSpPr>
+        <p:spPr>
+          <a:xfrm flipV="1">
+            <a:off x="2998068" y="2400868"/>
+            <a:ext cx="1080120" cy="929187"/>
+          </a:xfrm>
+          <a:prstGeom prst="straightConnector1">
+            <a:avLst/>
+          </a:prstGeom>
+          <a:ln>
+            <a:tailEnd type="triangle"/>
+          </a:ln>
+        </p:spPr>
+        <p:style>
+          <a:lnRef idx="3">
+            <a:schemeClr val="dk1"/>
+          </a:lnRef>
+          <a:fillRef idx="0">
+            <a:schemeClr val="dk1"/>
+          </a:fillRef>
+          <a:effectRef idx="2">
+            <a:schemeClr val="dk1"/>
+          </a:effectRef>
+          <a:fontRef idx="minor">
+            <a:schemeClr val="tx1"/>
+          </a:fontRef>
+        </p:style>
+      </p:cxnSp>
+      <p:cxnSp>
+        <p:nvCxnSpPr>
+          <p:cNvPr id="47" name="直接箭头连接符 46">
+            <a:extLst>
+              <a:ext uri="{FF2B5EF4-FFF2-40B4-BE49-F238E27FC236}">
+                <a16:creationId xmlns:a16="http://schemas.microsoft.com/office/drawing/2014/main" id="{6D04CB53-A4CF-4642-828F-08B50C78F99A}"/>
+              </a:ext>
+            </a:extLst>
+          </p:cNvPr>
+          <p:cNvCxnSpPr>
+            <a:cxnSpLocks/>
+            <a:stCxn id="6" idx="0"/>
+            <a:endCxn id="43" idx="2"/>
+          </p:cNvCxnSpPr>
+          <p:nvPr/>
+        </p:nvCxnSpPr>
+        <p:spPr>
+          <a:xfrm flipH="1" flipV="1">
+            <a:off x="4078188" y="2400868"/>
+            <a:ext cx="1224136" cy="2992369"/>
+          </a:xfrm>
+          <a:prstGeom prst="straightConnector1">
+            <a:avLst/>
+          </a:prstGeom>
+          <a:ln>
+            <a:tailEnd type="triangle"/>
+          </a:ln>
+        </p:spPr>
+        <p:style>
+          <a:lnRef idx="3">
+            <a:schemeClr val="dk1"/>
+          </a:lnRef>
+          <a:fillRef idx="0">
+            <a:schemeClr val="dk1"/>
+          </a:fillRef>
+          <a:effectRef idx="2">
+            <a:schemeClr val="dk1"/>
+          </a:effectRef>
+          <a:fontRef idx="minor">
+            <a:schemeClr val="tx1"/>
+          </a:fontRef>
+        </p:style>
+      </p:cxnSp>
+      <p:cxnSp>
+        <p:nvCxnSpPr>
+          <p:cNvPr id="48" name="直接箭头连接符 47">
+            <a:extLst>
+              <a:ext uri="{FF2B5EF4-FFF2-40B4-BE49-F238E27FC236}">
+                <a16:creationId xmlns:a16="http://schemas.microsoft.com/office/drawing/2014/main" id="{DB15366C-50A1-46BC-B240-3A653E278821}"/>
+              </a:ext>
+            </a:extLst>
+          </p:cNvPr>
+          <p:cNvCxnSpPr>
+            <a:cxnSpLocks/>
+            <a:stCxn id="24" idx="0"/>
+            <a:endCxn id="35" idx="2"/>
+          </p:cNvCxnSpPr>
+          <p:nvPr/>
+        </p:nvCxnSpPr>
+        <p:spPr>
+          <a:xfrm flipH="1" flipV="1">
+            <a:off x="2400480" y="2400868"/>
+            <a:ext cx="597588" cy="929187"/>
+          </a:xfrm>
+          <a:prstGeom prst="straightConnector1">
+            <a:avLst/>
+          </a:prstGeom>
+          <a:ln>
+            <a:tailEnd type="triangle"/>
+          </a:ln>
+        </p:spPr>
+        <p:style>
+          <a:lnRef idx="3">
+            <a:schemeClr val="dk1"/>
+          </a:lnRef>
+          <a:fillRef idx="0">
+            <a:schemeClr val="dk1"/>
+          </a:fillRef>
+          <a:effectRef idx="2">
+            <a:schemeClr val="dk1"/>
+          </a:effectRef>
+          <a:fontRef idx="minor">
+            <a:schemeClr val="tx1"/>
+          </a:fontRef>
+        </p:style>
+      </p:cxnSp>
+      <p:sp>
+        <p:nvSpPr>
+          <p:cNvPr id="57" name="矩形 56">
+            <a:extLst>
+              <a:ext uri="{FF2B5EF4-FFF2-40B4-BE49-F238E27FC236}">
+                <a16:creationId xmlns:a16="http://schemas.microsoft.com/office/drawing/2014/main" id="{A6FA5263-72DF-4F93-8F3E-F9A083A8564B}"/>
+              </a:ext>
+            </a:extLst>
+          </p:cNvPr>
+          <p:cNvSpPr/>
+          <p:nvPr/>
+        </p:nvSpPr>
+        <p:spPr>
+          <a:xfrm>
+            <a:off x="5014292" y="3330055"/>
+            <a:ext cx="1440160" cy="684076"/>
+          </a:xfrm>
+          <a:prstGeom prst="rect">
+            <a:avLst/>
+          </a:prstGeom>
+        </p:spPr>
+        <p:style>
+          <a:lnRef idx="2">
+            <a:schemeClr val="accent2">
+              <a:shade val="50000"/>
+            </a:schemeClr>
+          </a:lnRef>
+          <a:fillRef idx="1">
+            <a:schemeClr val="accent2"/>
+          </a:fillRef>
+          <a:effectRef idx="0">
+            <a:schemeClr val="accent2"/>
+          </a:effectRef>
+          <a:fontRef idx="minor">
+            <a:schemeClr val="lt1"/>
+          </a:fontRef>
+        </p:style>
+        <p:txBody>
+          <a:bodyPr rtlCol="0" anchor="ctr"/>
+          <a:lstStyle/>
+          <a:p>
+            <a:pPr algn="ctr"/>
+            <a:r>
+              <a:rPr lang="zh-CN" altLang="en-US" dirty="0"/>
+              <a:t>泛函分析</a:t>
+            </a:r>
+            <a:endParaRPr lang="en-US" altLang="zh-CN" dirty="0"/>
+          </a:p>
+          <a:p>
+            <a:pPr algn="ctr"/>
+            <a:r>
+              <a:rPr lang="zh-CN" altLang="en-US" dirty="0"/>
+              <a:t>（泛函）</a:t>
+            </a:r>
+          </a:p>
+        </p:txBody>
+      </p:sp>
+      <p:cxnSp>
+        <p:nvCxnSpPr>
+          <p:cNvPr id="58" name="直接箭头连接符 57">
+            <a:extLst>
+              <a:ext uri="{FF2B5EF4-FFF2-40B4-BE49-F238E27FC236}">
+                <a16:creationId xmlns:a16="http://schemas.microsoft.com/office/drawing/2014/main" id="{3490F909-FD82-43FB-A096-DCB8ED804A75}"/>
+              </a:ext>
+            </a:extLst>
+          </p:cNvPr>
+          <p:cNvCxnSpPr>
+            <a:cxnSpLocks/>
+            <a:stCxn id="28" idx="0"/>
+            <a:endCxn id="57" idx="2"/>
+          </p:cNvCxnSpPr>
+          <p:nvPr/>
+        </p:nvCxnSpPr>
+        <p:spPr>
+          <a:xfrm flipV="1">
+            <a:off x="3646140" y="4014131"/>
+            <a:ext cx="2088232" cy="1379106"/>
+          </a:xfrm>
+          <a:prstGeom prst="straightConnector1">
+            <a:avLst/>
+          </a:prstGeom>
+          <a:ln>
+            <a:tailEnd type="triangle"/>
+          </a:ln>
+        </p:spPr>
+        <p:style>
+          <a:lnRef idx="3">
+            <a:schemeClr val="dk1"/>
+          </a:lnRef>
+          <a:fillRef idx="0">
+            <a:schemeClr val="dk1"/>
+          </a:fillRef>
+          <a:effectRef idx="2">
+            <a:schemeClr val="dk1"/>
+          </a:effectRef>
+          <a:fontRef idx="minor">
+            <a:schemeClr val="tx1"/>
+          </a:fontRef>
+        </p:style>
+      </p:cxnSp>
+      <p:cxnSp>
+        <p:nvCxnSpPr>
+          <p:cNvPr id="61" name="直接箭头连接符 60">
+            <a:extLst>
+              <a:ext uri="{FF2B5EF4-FFF2-40B4-BE49-F238E27FC236}">
+                <a16:creationId xmlns:a16="http://schemas.microsoft.com/office/drawing/2014/main" id="{F017DCF6-3E2E-4A23-8771-14A273212AE5}"/>
+              </a:ext>
+            </a:extLst>
+          </p:cNvPr>
+          <p:cNvCxnSpPr>
+            <a:cxnSpLocks/>
+            <a:stCxn id="6" idx="0"/>
+            <a:endCxn id="57" idx="2"/>
+          </p:cNvCxnSpPr>
+          <p:nvPr/>
+        </p:nvCxnSpPr>
+        <p:spPr>
+          <a:xfrm flipV="1">
+            <a:off x="5302324" y="4014131"/>
+            <a:ext cx="432048" cy="1379106"/>
+          </a:xfrm>
+          <a:prstGeom prst="straightConnector1">
+            <a:avLst/>
+          </a:prstGeom>
+          <a:ln>
+            <a:tailEnd type="triangle"/>
+          </a:ln>
+        </p:spPr>
+        <p:style>
+          <a:lnRef idx="3">
+            <a:schemeClr val="dk1"/>
+          </a:lnRef>
+          <a:fillRef idx="0">
+            <a:schemeClr val="dk1"/>
+          </a:fillRef>
+          <a:effectRef idx="2">
+            <a:schemeClr val="dk1"/>
+          </a:effectRef>
+          <a:fontRef idx="minor">
+            <a:schemeClr val="tx1"/>
+          </a:fontRef>
+        </p:style>
+      </p:cxnSp>
+      <p:cxnSp>
+        <p:nvCxnSpPr>
+          <p:cNvPr id="66" name="直接箭头连接符 65">
+            <a:extLst>
+              <a:ext uri="{FF2B5EF4-FFF2-40B4-BE49-F238E27FC236}">
+                <a16:creationId xmlns:a16="http://schemas.microsoft.com/office/drawing/2014/main" id="{FED616CB-DD33-490A-AA5A-3A6E8872DBD1}"/>
+              </a:ext>
+            </a:extLst>
+          </p:cNvPr>
+          <p:cNvCxnSpPr>
+            <a:cxnSpLocks/>
+            <a:stCxn id="57" idx="0"/>
+            <a:endCxn id="38" idx="2"/>
+          </p:cNvCxnSpPr>
+          <p:nvPr/>
+        </p:nvCxnSpPr>
+        <p:spPr>
+          <a:xfrm flipV="1">
+            <a:off x="5734372" y="2400868"/>
+            <a:ext cx="0" cy="929187"/>
+          </a:xfrm>
+          <a:prstGeom prst="straightConnector1">
+            <a:avLst/>
+          </a:prstGeom>
+          <a:ln>
+            <a:tailEnd type="triangle"/>
+          </a:ln>
+        </p:spPr>
+        <p:style>
+          <a:lnRef idx="3">
+            <a:schemeClr val="dk1"/>
+          </a:lnRef>
+          <a:fillRef idx="0">
+            <a:schemeClr val="dk1"/>
+          </a:fillRef>
+          <a:effectRef idx="2">
+            <a:schemeClr val="dk1"/>
+          </a:effectRef>
+          <a:fontRef idx="minor">
+            <a:schemeClr val="tx1"/>
+          </a:fontRef>
+        </p:style>
+      </p:cxnSp>
+      <p:cxnSp>
+        <p:nvCxnSpPr>
+          <p:cNvPr id="124" name="直接箭头连接符 123">
+            <a:extLst>
+              <a:ext uri="{FF2B5EF4-FFF2-40B4-BE49-F238E27FC236}">
+                <a16:creationId xmlns:a16="http://schemas.microsoft.com/office/drawing/2014/main" id="{6FD9741E-B347-44B1-B5BE-36B89372A3B3}"/>
+              </a:ext>
+            </a:extLst>
+          </p:cNvPr>
+          <p:cNvCxnSpPr>
+            <a:cxnSpLocks/>
+            <a:stCxn id="26" idx="0"/>
+            <a:endCxn id="29" idx="2"/>
+          </p:cNvCxnSpPr>
+          <p:nvPr/>
+        </p:nvCxnSpPr>
+        <p:spPr>
+          <a:xfrm flipV="1">
+            <a:off x="8398668" y="4014130"/>
+            <a:ext cx="754481" cy="1368153"/>
+          </a:xfrm>
+          <a:prstGeom prst="straightConnector1">
+            <a:avLst/>
+          </a:prstGeom>
+          <a:ln>
+            <a:tailEnd type="triangle"/>
+          </a:ln>
+        </p:spPr>
+        <p:style>
+          <a:lnRef idx="3">
+            <a:schemeClr val="dk1"/>
+          </a:lnRef>
+          <a:fillRef idx="0">
+            <a:schemeClr val="dk1"/>
+          </a:fillRef>
+          <a:effectRef idx="2">
+            <a:schemeClr val="dk1"/>
+          </a:effectRef>
+          <a:fontRef idx="minor">
+            <a:schemeClr val="tx1"/>
+          </a:fontRef>
+        </p:style>
+      </p:cxnSp>
+      <p:cxnSp>
+        <p:nvCxnSpPr>
+          <p:cNvPr id="128" name="直接箭头连接符 127">
+            <a:extLst>
+              <a:ext uri="{FF2B5EF4-FFF2-40B4-BE49-F238E27FC236}">
+                <a16:creationId xmlns:a16="http://schemas.microsoft.com/office/drawing/2014/main" id="{3601DB09-6AC9-438D-B188-3015A801881C}"/>
+              </a:ext>
+            </a:extLst>
+          </p:cNvPr>
+          <p:cNvCxnSpPr>
+            <a:cxnSpLocks/>
+            <a:stCxn id="29" idx="0"/>
+            <a:endCxn id="40" idx="2"/>
+          </p:cNvCxnSpPr>
+          <p:nvPr/>
+        </p:nvCxnSpPr>
+        <p:spPr>
+          <a:xfrm flipH="1" flipV="1">
+            <a:off x="8398668" y="2400868"/>
+            <a:ext cx="754481" cy="929186"/>
+          </a:xfrm>
+          <a:prstGeom prst="straightConnector1">
+            <a:avLst/>
+          </a:prstGeom>
+          <a:ln>
+            <a:tailEnd type="triangle"/>
+          </a:ln>
+        </p:spPr>
+        <p:style>
+          <a:lnRef idx="3">
+            <a:schemeClr val="dk1"/>
+          </a:lnRef>
+          <a:fillRef idx="0">
+            <a:schemeClr val="dk1"/>
+          </a:fillRef>
+          <a:effectRef idx="2">
+            <a:schemeClr val="dk1"/>
+          </a:effectRef>
+          <a:fontRef idx="minor">
+            <a:schemeClr val="tx1"/>
+          </a:fontRef>
+        </p:style>
+      </p:cxnSp>
+      <p:sp>
+        <p:nvSpPr>
+          <p:cNvPr id="138" name="矩形 137">
+            <a:extLst>
+              <a:ext uri="{FF2B5EF4-FFF2-40B4-BE49-F238E27FC236}">
+                <a16:creationId xmlns:a16="http://schemas.microsoft.com/office/drawing/2014/main" id="{8EAF2BE1-1392-49DB-A1E7-1FA1375A87DD}"/>
+              </a:ext>
+            </a:extLst>
+          </p:cNvPr>
+          <p:cNvSpPr/>
+          <p:nvPr/>
+        </p:nvSpPr>
+        <p:spPr>
+          <a:xfrm>
+            <a:off x="10198868" y="1196752"/>
+            <a:ext cx="1440160" cy="2583222"/>
+          </a:xfrm>
+          <a:prstGeom prst="rect">
+            <a:avLst/>
+          </a:prstGeom>
+        </p:spPr>
+        <p:style>
+          <a:lnRef idx="2">
+            <a:schemeClr val="dk1">
+              <a:shade val="50000"/>
+            </a:schemeClr>
+          </a:lnRef>
+          <a:fillRef idx="1">
+            <a:schemeClr val="dk1"/>
+          </a:fillRef>
+          <a:effectRef idx="0">
+            <a:schemeClr val="dk1"/>
+          </a:effectRef>
+          <a:fontRef idx="minor">
+            <a:schemeClr val="lt1"/>
+          </a:fontRef>
+        </p:style>
+        <p:txBody>
+          <a:bodyPr rtlCol="0" anchor="ctr"/>
+          <a:lstStyle/>
+          <a:p>
+            <a:pPr algn="ctr"/>
+            <a:r>
+              <a:rPr lang="zh-CN" altLang="en-US" dirty="0"/>
+              <a:t>范畴论</a:t>
+            </a:r>
+            <a:endParaRPr lang="en-US" altLang="zh-CN" dirty="0"/>
+          </a:p>
+          <a:p>
+            <a:pPr algn="ctr"/>
+            <a:endParaRPr lang="en-US" altLang="zh-CN" dirty="0"/>
+          </a:p>
+          <a:p>
+            <a:pPr algn="ctr"/>
+            <a:r>
+              <a:rPr lang="zh-CN" altLang="en-US" dirty="0"/>
+              <a:t>高阶函数式编程，</a:t>
+            </a:r>
+            <a:r>
+              <a:rPr lang="en-US" altLang="zh-CN" dirty="0"/>
+              <a:t>e.g. Scala Cats</a:t>
+            </a:r>
+            <a:endParaRPr lang="zh-CN" altLang="en-US" dirty="0"/>
+          </a:p>
+        </p:txBody>
+      </p:sp>
+      <p:sp>
+        <p:nvSpPr>
+          <p:cNvPr id="145" name="矩形 144">
+            <a:extLst>
+              <a:ext uri="{FF2B5EF4-FFF2-40B4-BE49-F238E27FC236}">
+                <a16:creationId xmlns:a16="http://schemas.microsoft.com/office/drawing/2014/main" id="{EFA3BB85-41B2-44FB-842B-3A25C75AE103}"/>
+              </a:ext>
+            </a:extLst>
+          </p:cNvPr>
+          <p:cNvSpPr/>
+          <p:nvPr/>
+        </p:nvSpPr>
+        <p:spPr>
+          <a:xfrm>
+            <a:off x="9334772" y="319185"/>
+            <a:ext cx="1944216" cy="504057"/>
+          </a:xfrm>
+          <a:prstGeom prst="rect">
+            <a:avLst/>
+          </a:prstGeom>
+          <a:solidFill>
+            <a:schemeClr val="tx2">
+              <a:lumMod val="50000"/>
+              <a:lumOff val="50000"/>
+            </a:schemeClr>
+          </a:solidFill>
+          <a:effectLst>
+            <a:glow rad="139700">
+              <a:schemeClr val="accent3">
+                <a:satMod val="175000"/>
+                <a:alpha val="40000"/>
+              </a:schemeClr>
+            </a:glow>
+            <a:outerShdw blurRad="50800" dist="38100" dir="2700000" algn="tl" rotWithShape="0">
+              <a:prstClr val="black">
+                <a:alpha val="40000"/>
+              </a:prstClr>
+            </a:outerShdw>
+          </a:effectLst>
+          <a:scene3d>
+            <a:camera prst="obliqueBottomRight"/>
+            <a:lightRig rig="threePt" dir="t"/>
+          </a:scene3d>
+          <a:sp3d>
+            <a:bevelT w="165100" prst="coolSlant"/>
+          </a:sp3d>
+        </p:spPr>
+        <p:style>
+          <a:lnRef idx="2">
+            <a:schemeClr val="accent6">
+              <a:shade val="50000"/>
+            </a:schemeClr>
+          </a:lnRef>
+          <a:fillRef idx="1">
+            <a:schemeClr val="accent6"/>
+          </a:fillRef>
+          <a:effectRef idx="0">
+            <a:schemeClr val="accent6"/>
+          </a:effectRef>
+          <a:fontRef idx="minor">
+            <a:schemeClr val="lt1"/>
+          </a:fontRef>
+        </p:style>
+        <p:txBody>
+          <a:bodyPr rtlCol="0" anchor="ctr"/>
+          <a:lstStyle/>
+          <a:p>
+            <a:pPr algn="ctr"/>
+            <a:r>
+              <a:rPr lang="zh-CN" altLang="en-US" dirty="0">
+                <a:solidFill>
+                  <a:srgbClr val="FFFF00"/>
+                </a:solidFill>
+              </a:rPr>
+              <a:t>你渴望力量吗</a:t>
+            </a:r>
+          </a:p>
+        </p:txBody>
+      </p:sp>
+      <p:sp>
+        <p:nvSpPr>
+          <p:cNvPr id="148" name="矩形 147">
+            <a:extLst>
+              <a:ext uri="{FF2B5EF4-FFF2-40B4-BE49-F238E27FC236}">
+                <a16:creationId xmlns:a16="http://schemas.microsoft.com/office/drawing/2014/main" id="{39F3FB28-02F7-4FB7-B32E-99EDEFE5A99B}"/>
+              </a:ext>
+            </a:extLst>
+          </p:cNvPr>
+          <p:cNvSpPr/>
+          <p:nvPr/>
+        </p:nvSpPr>
+        <p:spPr>
+          <a:xfrm>
+            <a:off x="6869206" y="3330054"/>
+            <a:ext cx="1440160" cy="684076"/>
+          </a:xfrm>
+          <a:prstGeom prst="rect">
+            <a:avLst/>
+          </a:prstGeom>
+        </p:spPr>
+        <p:style>
+          <a:lnRef idx="2">
+            <a:schemeClr val="accent2">
+              <a:shade val="50000"/>
+            </a:schemeClr>
+          </a:lnRef>
+          <a:fillRef idx="1">
+            <a:schemeClr val="accent2"/>
+          </a:fillRef>
+          <a:effectRef idx="0">
+            <a:schemeClr val="accent2"/>
+          </a:effectRef>
+          <a:fontRef idx="minor">
+            <a:schemeClr val="lt1"/>
+          </a:fontRef>
+        </p:style>
+        <p:txBody>
+          <a:bodyPr rtlCol="0" anchor="ctr"/>
+          <a:lstStyle/>
+          <a:p>
+            <a:pPr algn="ctr"/>
+            <a:r>
+              <a:rPr lang="zh-CN" altLang="en-US" dirty="0"/>
+              <a:t>微分几何</a:t>
+            </a:r>
+          </a:p>
+        </p:txBody>
+      </p:sp>
+      <p:cxnSp>
+        <p:nvCxnSpPr>
+          <p:cNvPr id="159" name="直接箭头连接符 158">
+            <a:extLst>
+              <a:ext uri="{FF2B5EF4-FFF2-40B4-BE49-F238E27FC236}">
+                <a16:creationId xmlns:a16="http://schemas.microsoft.com/office/drawing/2014/main" id="{97222DE4-868D-46F9-8639-FEC31DE9D5A2}"/>
+              </a:ext>
+            </a:extLst>
+          </p:cNvPr>
+          <p:cNvCxnSpPr>
+            <a:cxnSpLocks/>
+            <a:stCxn id="28" idx="0"/>
+            <a:endCxn id="148" idx="2"/>
+          </p:cNvCxnSpPr>
+          <p:nvPr/>
+        </p:nvCxnSpPr>
+        <p:spPr>
+          <a:xfrm flipV="1">
+            <a:off x="3646140" y="4014130"/>
+            <a:ext cx="3943146" cy="1379107"/>
+          </a:xfrm>
+          <a:prstGeom prst="straightConnector1">
+            <a:avLst/>
+          </a:prstGeom>
+          <a:ln>
+            <a:tailEnd type="triangle"/>
+          </a:ln>
+        </p:spPr>
+        <p:style>
+          <a:lnRef idx="3">
+            <a:schemeClr val="dk1"/>
+          </a:lnRef>
+          <a:fillRef idx="0">
+            <a:schemeClr val="dk1"/>
+          </a:fillRef>
+          <a:effectRef idx="2">
+            <a:schemeClr val="dk1"/>
+          </a:effectRef>
+          <a:fontRef idx="minor">
+            <a:schemeClr val="tx1"/>
+          </a:fontRef>
+        </p:style>
+      </p:cxnSp>
+      <p:cxnSp>
+        <p:nvCxnSpPr>
+          <p:cNvPr id="163" name="直接箭头连接符 162">
+            <a:extLst>
+              <a:ext uri="{FF2B5EF4-FFF2-40B4-BE49-F238E27FC236}">
+                <a16:creationId xmlns:a16="http://schemas.microsoft.com/office/drawing/2014/main" id="{ED047E35-2724-496B-AF80-6ED21941EB99}"/>
+              </a:ext>
+            </a:extLst>
+          </p:cNvPr>
+          <p:cNvCxnSpPr>
+            <a:cxnSpLocks/>
+            <a:stCxn id="6" idx="0"/>
+            <a:endCxn id="148" idx="2"/>
+          </p:cNvCxnSpPr>
+          <p:nvPr/>
+        </p:nvCxnSpPr>
+        <p:spPr>
+          <a:xfrm flipV="1">
+            <a:off x="5302324" y="4014130"/>
+            <a:ext cx="2286962" cy="1379107"/>
+          </a:xfrm>
+          <a:prstGeom prst="straightConnector1">
+            <a:avLst/>
+          </a:prstGeom>
+          <a:ln>
+            <a:tailEnd type="triangle"/>
+          </a:ln>
+        </p:spPr>
+        <p:style>
+          <a:lnRef idx="3">
+            <a:schemeClr val="dk1"/>
+          </a:lnRef>
+          <a:fillRef idx="0">
+            <a:schemeClr val="dk1"/>
+          </a:fillRef>
+          <a:effectRef idx="2">
+            <a:schemeClr val="dk1"/>
+          </a:effectRef>
+          <a:fontRef idx="minor">
+            <a:schemeClr val="tx1"/>
+          </a:fontRef>
+        </p:style>
+      </p:cxnSp>
+      <p:cxnSp>
+        <p:nvCxnSpPr>
+          <p:cNvPr id="167" name="连接符: 曲线 166">
+            <a:extLst>
+              <a:ext uri="{FF2B5EF4-FFF2-40B4-BE49-F238E27FC236}">
+                <a16:creationId xmlns:a16="http://schemas.microsoft.com/office/drawing/2014/main" id="{E269BFFE-F426-4117-8670-7A5BD873A7DA}"/>
+              </a:ext>
+            </a:extLst>
+          </p:cNvPr>
+          <p:cNvCxnSpPr>
+            <a:stCxn id="57" idx="0"/>
+            <a:endCxn id="148" idx="0"/>
+          </p:cNvCxnSpPr>
+          <p:nvPr/>
+        </p:nvCxnSpPr>
+        <p:spPr>
+          <a:xfrm rot="5400000" flipH="1" flipV="1">
+            <a:off x="6661829" y="2402598"/>
+            <a:ext cx="1" cy="1854914"/>
+          </a:xfrm>
+          <a:prstGeom prst="curvedConnector3">
+            <a:avLst>
+              <a:gd name="adj1" fmla="val 22860100000"/>
+            </a:avLst>
+          </a:prstGeom>
+          <a:ln>
+            <a:prstDash val="dash"/>
+            <a:tailEnd type="triangle"/>
+          </a:ln>
+        </p:spPr>
+        <p:style>
+          <a:lnRef idx="3">
+            <a:schemeClr val="dk1"/>
+          </a:lnRef>
+          <a:fillRef idx="0">
+            <a:schemeClr val="dk1"/>
+          </a:fillRef>
+          <a:effectRef idx="2">
+            <a:schemeClr val="dk1"/>
+          </a:effectRef>
+          <a:fontRef idx="minor">
+            <a:schemeClr val="tx1"/>
+          </a:fontRef>
+        </p:style>
+      </p:cxnSp>
+      <p:cxnSp>
+        <p:nvCxnSpPr>
+          <p:cNvPr id="168" name="直接箭头连接符 167">
+            <a:extLst>
+              <a:ext uri="{FF2B5EF4-FFF2-40B4-BE49-F238E27FC236}">
+                <a16:creationId xmlns:a16="http://schemas.microsoft.com/office/drawing/2014/main" id="{446469C4-2814-4FDE-A4D2-B883ECF9DEF8}"/>
+              </a:ext>
+            </a:extLst>
+          </p:cNvPr>
+          <p:cNvCxnSpPr>
+            <a:cxnSpLocks/>
+            <a:stCxn id="148" idx="0"/>
+            <a:endCxn id="40" idx="2"/>
+          </p:cNvCxnSpPr>
+          <p:nvPr/>
+        </p:nvCxnSpPr>
+        <p:spPr>
+          <a:xfrm flipV="1">
+            <a:off x="7589286" y="2400868"/>
+            <a:ext cx="809382" cy="929186"/>
+          </a:xfrm>
+          <a:prstGeom prst="straightConnector1">
+            <a:avLst/>
+          </a:prstGeom>
+          <a:ln>
+            <a:tailEnd type="triangle"/>
+          </a:ln>
+        </p:spPr>
+        <p:style>
+          <a:lnRef idx="3">
+            <a:schemeClr val="dk1"/>
+          </a:lnRef>
+          <a:fillRef idx="0">
+            <a:schemeClr val="dk1"/>
+          </a:fillRef>
+          <a:effectRef idx="2">
+            <a:schemeClr val="dk1"/>
+          </a:effectRef>
+          <a:fontRef idx="minor">
+            <a:schemeClr val="tx1"/>
+          </a:fontRef>
+        </p:style>
+      </p:cxnSp>
+    </p:spTree>
+    <p:extLst>
+      <p:ext uri="{BB962C8B-B14F-4D97-AF65-F5344CB8AC3E}">
+        <p14:creationId xmlns:p14="http://schemas.microsoft.com/office/powerpoint/2010/main" val="3632724116"/>
+      </p:ext>
+    </p:extLst>
+  </p:cSld>
+  <p:clrMapOvr>
+    <a:masterClrMapping/>
+  </p:clrMapOvr>
+  <mc:AlternateContent xmlns:mc="http://schemas.openxmlformats.org/markup-compatibility/2006">
+    <mc:Choice xmlns:p14="http://schemas.microsoft.com/office/powerpoint/2010/main" Requires="p14">
+      <p:transition spd="med" p14:dur="700">
+        <p:fade/>
+      </p:transition>
+    </mc:Choice>
+    <mc:Fallback>
+      <p:transition spd="med">
+        <p:fade/>
+      </p:transition>
+    </mc:Fallback>
+  </mc:AlternateContent>
+  <p:timing>
+    <p:tnLst>
+      <p:par>
+        <p:cTn id="1" dur="indefinite" restart="never" nodeType="tmRoot">
+          <p:childTnLst>
+            <p:seq concurrent="1" nextAc="seek">
+              <p:cTn id="2" dur="indefinite" nodeType="mainSeq">
+                <p:childTnLst>
+                  <p:par>
+                    <p:cTn id="3" fill="hold">
+                      <p:stCondLst>
+                        <p:cond delay="indefinite"/>
+                      </p:stCondLst>
+                      <p:childTnLst>
+                        <p:par>
+                          <p:cTn id="4" fill="hold">
+                            <p:stCondLst>
+                              <p:cond delay="0"/>
+                            </p:stCondLst>
+                            <p:childTnLst>
+                              <p:par>
+                                <p:cTn id="5" presetID="16" presetClass="entr" presetSubtype="21" fill="hold" grpId="0" nodeType="clickEffect">
+                                  <p:stCondLst>
+                                    <p:cond delay="0"/>
+                                  </p:stCondLst>
+                                  <p:childTnLst>
+                                    <p:set>
+                                      <p:cBhvr>
+                                        <p:cTn id="6" dur="1" fill="hold">
+                                          <p:stCondLst>
+                                            <p:cond delay="0"/>
+                                          </p:stCondLst>
+                                        </p:cTn>
+                                        <p:tgtEl>
+                                          <p:spTgt spid="135"/>
+                                        </p:tgtEl>
+                                        <p:attrNameLst>
+                                          <p:attrName>style.visibility</p:attrName>
+                                        </p:attrNameLst>
+                                      </p:cBhvr>
+                                      <p:to>
+                                        <p:strVal val="visible"/>
+                                      </p:to>
+                                    </p:set>
+                                    <p:animEffect transition="in" filter="barn(inVertical)">
+                                      <p:cBhvr>
+                                        <p:cTn id="7" dur="500"/>
+                                        <p:tgtEl>
+                                          <p:spTgt spid="135"/>
+                                        </p:tgtEl>
+                                      </p:cBhvr>
+                                    </p:animEffect>
+                                  </p:childTnLst>
+                                </p:cTn>
+                              </p:par>
+                            </p:childTnLst>
+                          </p:cTn>
+                        </p:par>
+                      </p:childTnLst>
+                    </p:cTn>
+                  </p:par>
+                  <p:par>
+                    <p:cTn id="8" fill="hold">
+                      <p:stCondLst>
+                        <p:cond delay="indefinite"/>
+                      </p:stCondLst>
+                      <p:childTnLst>
+                        <p:par>
+                          <p:cTn id="9" fill="hold">
+                            <p:stCondLst>
+                              <p:cond delay="0"/>
+                            </p:stCondLst>
+                            <p:childTnLst>
+                              <p:par>
+                                <p:cTn id="10" presetID="16" presetClass="entr" presetSubtype="21" fill="hold" grpId="0" nodeType="clickEffect">
+                                  <p:stCondLst>
+                                    <p:cond delay="0"/>
+                                  </p:stCondLst>
+                                  <p:childTnLst>
+                                    <p:set>
+                                      <p:cBhvr>
+                                        <p:cTn id="11" dur="1" fill="hold">
+                                          <p:stCondLst>
+                                            <p:cond delay="0"/>
+                                          </p:stCondLst>
+                                        </p:cTn>
+                                        <p:tgtEl>
+                                          <p:spTgt spid="136"/>
+                                        </p:tgtEl>
+                                        <p:attrNameLst>
+                                          <p:attrName>style.visibility</p:attrName>
+                                        </p:attrNameLst>
+                                      </p:cBhvr>
+                                      <p:to>
+                                        <p:strVal val="visible"/>
+                                      </p:to>
+                                    </p:set>
+                                    <p:animEffect transition="in" filter="barn(inVertical)">
+                                      <p:cBhvr>
+                                        <p:cTn id="12" dur="500"/>
+                                        <p:tgtEl>
+                                          <p:spTgt spid="136"/>
+                                        </p:tgtEl>
+                                      </p:cBhvr>
+                                    </p:animEffect>
+                                  </p:childTnLst>
+                                </p:cTn>
+                              </p:par>
+                            </p:childTnLst>
+                          </p:cTn>
+                        </p:par>
+                      </p:childTnLst>
+                    </p:cTn>
+                  </p:par>
+                  <p:par>
+                    <p:cTn id="13" fill="hold">
+                      <p:stCondLst>
+                        <p:cond delay="indefinite"/>
+                      </p:stCondLst>
+                      <p:childTnLst>
+                        <p:par>
+                          <p:cTn id="14" fill="hold">
+                            <p:stCondLst>
+                              <p:cond delay="0"/>
+                            </p:stCondLst>
+                            <p:childTnLst>
+                              <p:par>
+                                <p:cTn id="15" presetID="16" presetClass="entr" presetSubtype="21" fill="hold" grpId="0" nodeType="clickEffect">
+                                  <p:stCondLst>
+                                    <p:cond delay="0"/>
+                                  </p:stCondLst>
+                                  <p:childTnLst>
+                                    <p:set>
+                                      <p:cBhvr>
+                                        <p:cTn id="16" dur="1" fill="hold">
+                                          <p:stCondLst>
+                                            <p:cond delay="0"/>
+                                          </p:stCondLst>
+                                        </p:cTn>
+                                        <p:tgtEl>
+                                          <p:spTgt spid="137"/>
+                                        </p:tgtEl>
+                                        <p:attrNameLst>
+                                          <p:attrName>style.visibility</p:attrName>
+                                        </p:attrNameLst>
+                                      </p:cBhvr>
+                                      <p:to>
+                                        <p:strVal val="visible"/>
+                                      </p:to>
+                                    </p:set>
+                                    <p:animEffect transition="in" filter="barn(inVertical)">
+                                      <p:cBhvr>
+                                        <p:cTn id="17" dur="500"/>
+                                        <p:tgtEl>
+                                          <p:spTgt spid="137"/>
+                                        </p:tgtEl>
+                                      </p:cBhvr>
+                                    </p:animEffect>
+                                  </p:childTnLst>
+                                </p:cTn>
+                              </p:par>
+                            </p:childTnLst>
+                          </p:cTn>
+                        </p:par>
+                      </p:childTnLst>
+                    </p:cTn>
+                  </p:par>
+                </p:childTnLst>
+              </p:cTn>
+              <p:prevCondLst>
+                <p:cond evt="onPrev" delay="0">
+                  <p:tgtEl>
+                    <p:sldTgt/>
+                  </p:tgtEl>
+                </p:cond>
+              </p:prevCondLst>
+              <p:nextCondLst>
+                <p:cond evt="onNext" delay="0">
+                  <p:tgtEl>
+                    <p:sldTgt/>
+                  </p:tgtEl>
+                </p:cond>
+              </p:nextCondLst>
+            </p:seq>
+          </p:childTnLst>
+        </p:cTn>
+      </p:par>
+    </p:tnLst>
+    <p:bldLst>
+      <p:bldP spid="137" grpId="0" animBg="1"/>
+      <p:bldP spid="136" grpId="0" animBg="1"/>
+      <p:bldP spid="135" grpId="0" animBg="1"/>
+    </p:bldLst>
+  </p:timing>
+</p:sld>
+</file>
+
+<file path=ppt/slides/slide21.xml><?xml version="1.0" encoding="utf-8"?>
+<p:sld xmlns:a="http://schemas.openxmlformats.org/drawingml/2006/main" xmlns:r="http://schemas.openxmlformats.org/officeDocument/2006/relationships" xmlns:p="http://schemas.openxmlformats.org/presentationml/2006/main">
+  <p:cSld>
+    <p:spTree>
+      <p:nvGrpSpPr>
+        <p:cNvPr id="1" name=""/>
+        <p:cNvGrpSpPr/>
+        <p:nvPr/>
+      </p:nvGrpSpPr>
+      <p:grpSpPr>
+        <a:xfrm>
+          <a:off x="0" y="0"/>
+          <a:ext cx="0" cy="0"/>
+          <a:chOff x="0" y="0"/>
+          <a:chExt cx="0" cy="0"/>
+        </a:xfrm>
+      </p:grpSpPr>
+      <p:sp>
+        <p:nvSpPr>
+          <p:cNvPr id="2" name="标题 1">
+            <a:extLst>
+              <a:ext uri="{FF2B5EF4-FFF2-40B4-BE49-F238E27FC236}">
+                <a16:creationId xmlns:a16="http://schemas.microsoft.com/office/drawing/2014/main" id="{25B1E346-61E0-45DA-9D10-CE11866FB2DE}"/>
+              </a:ext>
+            </a:extLst>
+          </p:cNvPr>
+          <p:cNvSpPr txBox="1">
+            <a:spLocks/>
+          </p:cNvSpPr>
+          <p:nvPr/>
+        </p:nvSpPr>
+        <p:spPr>
+          <a:xfrm>
+            <a:off x="1845940" y="1689968"/>
+            <a:ext cx="2196720" cy="874936"/>
+          </a:xfrm>
+          <a:prstGeom prst="rect">
+            <a:avLst/>
+          </a:prstGeom>
+        </p:spPr>
+        <p:txBody>
+          <a:bodyPr/>
+          <a:lstStyle>
+            <a:lvl1pPr algn="l" defTabSz="914400" rtl="0" eaLnBrk="1" latinLnBrk="0" hangingPunct="1">
+              <a:lnSpc>
+                <a:spcPct val="90000"/>
+              </a:lnSpc>
+              <a:spcBef>
+                <a:spcPct val="0"/>
+              </a:spcBef>
+              <a:buNone/>
+              <a:defRPr sz="3600" kern="1200">
+                <a:solidFill>
+                  <a:schemeClr val="tx1">
+                    <a:lumMod val="75000"/>
+                  </a:schemeClr>
+                </a:solidFill>
+                <a:latin typeface="微软雅黑" panose="020B0503020204020204" pitchFamily="34" charset="-122"/>
+                <a:ea typeface="微软雅黑" panose="020B0503020204020204" pitchFamily="34" charset="-122"/>
+                <a:cs typeface="+mj-cs"/>
+              </a:defRPr>
+            </a:lvl1pPr>
+          </a:lstStyle>
+          <a:p>
+            <a:r>
+              <a:rPr lang="en-US" altLang="zh-CN" dirty="0">
+                <a:latin typeface="Arial" panose="020B0604020202020204" pitchFamily="34" charset="0"/>
+                <a:sym typeface="Arial" panose="020B0604020202020204" pitchFamily="34" charset="0"/>
+              </a:rPr>
+              <a:t>Fin.</a:t>
+            </a:r>
+            <a:endParaRPr lang="zh-CN" altLang="en-US" dirty="0"/>
+          </a:p>
+        </p:txBody>
+      </p:sp>
+      <p:sp>
+        <p:nvSpPr>
+          <p:cNvPr id="3" name="文本框 2">
+            <a:extLst>
+              <a:ext uri="{FF2B5EF4-FFF2-40B4-BE49-F238E27FC236}">
+                <a16:creationId xmlns:a16="http://schemas.microsoft.com/office/drawing/2014/main" id="{D7C21974-A63E-4BD7-B67F-98FDC865CA86}"/>
+              </a:ext>
+            </a:extLst>
+          </p:cNvPr>
+          <p:cNvSpPr txBox="1"/>
+          <p:nvPr/>
+        </p:nvSpPr>
+        <p:spPr>
+          <a:xfrm>
+            <a:off x="1845940" y="2564904"/>
+            <a:ext cx="7879080" cy="707886"/>
+          </a:xfrm>
+          <a:prstGeom prst="rect">
+            <a:avLst/>
+          </a:prstGeom>
+          <a:noFill/>
+        </p:spPr>
+        <p:txBody>
+          <a:bodyPr wrap="none" rtlCol="0">
+            <a:spAutoFit/>
+          </a:bodyPr>
+          <a:lstStyle/>
+          <a:p>
+            <a:r>
+              <a:rPr lang="zh-CN" altLang="en-US" sz="4000" dirty="0"/>
+              <a:t>感谢大家百忙之中抽出时间的聆听</a:t>
+            </a:r>
+          </a:p>
+        </p:txBody>
+      </p:sp>
+      <p:sp>
+        <p:nvSpPr>
+          <p:cNvPr id="4" name="副标题 2">
+            <a:extLst>
+              <a:ext uri="{FF2B5EF4-FFF2-40B4-BE49-F238E27FC236}">
+                <a16:creationId xmlns:a16="http://schemas.microsoft.com/office/drawing/2014/main" id="{F82D915E-E5F3-475A-982D-78A233008504}"/>
+              </a:ext>
+            </a:extLst>
+          </p:cNvPr>
+          <p:cNvSpPr txBox="1">
+            <a:spLocks/>
+          </p:cNvSpPr>
+          <p:nvPr/>
+        </p:nvSpPr>
+        <p:spPr>
+          <a:xfrm>
+            <a:off x="1845940" y="3933056"/>
+            <a:ext cx="8329031" cy="1527944"/>
+          </a:xfrm>
+          <a:prstGeom prst="rect">
+            <a:avLst/>
+          </a:prstGeom>
+        </p:spPr>
+        <p:txBody>
+          <a:bodyPr rtlCol="0">
+            <a:normAutofit lnSpcReduction="10000"/>
+          </a:bodyPr>
+          <a:lstStyle>
+            <a:lvl1pPr marL="246888" indent="-246888" algn="l" defTabSz="914400" rtl="0" eaLnBrk="1" latinLnBrk="0" hangingPunct="1">
+              <a:lnSpc>
+                <a:spcPct val="90000"/>
+              </a:lnSpc>
+              <a:spcBef>
+                <a:spcPts val="1400"/>
+              </a:spcBef>
+              <a:buFont typeface="Euphemia" pitchFamily="34" charset="0"/>
+              <a:buChar char="›"/>
+              <a:defRPr sz="2800" kern="1200">
+                <a:solidFill>
+                  <a:schemeClr val="tx1"/>
+                </a:solidFill>
+                <a:latin typeface="微软雅黑" panose="020B0503020204020204" pitchFamily="34" charset="-122"/>
+                <a:ea typeface="微软雅黑" panose="020B0503020204020204" pitchFamily="34" charset="-122"/>
+                <a:cs typeface="+mn-cs"/>
+              </a:defRPr>
+            </a:lvl1pPr>
+            <a:lvl2pPr marL="612648" indent="-246888" algn="l" defTabSz="914400" rtl="0" eaLnBrk="1" latinLnBrk="0" hangingPunct="1">
+              <a:lnSpc>
+                <a:spcPct val="90000"/>
+              </a:lnSpc>
+              <a:spcBef>
+                <a:spcPts val="600"/>
+              </a:spcBef>
+              <a:buFont typeface="Euphemia" pitchFamily="34" charset="0"/>
+              <a:buChar char="–"/>
+              <a:defRPr sz="2400" kern="1200">
+                <a:solidFill>
+                  <a:schemeClr val="tx1"/>
+                </a:solidFill>
+                <a:latin typeface="微软雅黑" panose="020B0503020204020204" pitchFamily="34" charset="-122"/>
+                <a:ea typeface="微软雅黑" panose="020B0503020204020204" pitchFamily="34" charset="-122"/>
+                <a:cs typeface="+mn-cs"/>
+              </a:defRPr>
+            </a:lvl2pPr>
+            <a:lvl3pPr marL="978408" indent="-246888" algn="l" defTabSz="914400" rtl="0" eaLnBrk="1" latinLnBrk="0" hangingPunct="1">
+              <a:lnSpc>
+                <a:spcPct val="90000"/>
+              </a:lnSpc>
+              <a:spcBef>
+                <a:spcPts val="600"/>
+              </a:spcBef>
+              <a:buFont typeface="Euphemia" pitchFamily="34" charset="0"/>
+              <a:buChar char="›"/>
+              <a:defRPr sz="2000" kern="1200">
+                <a:solidFill>
+                  <a:schemeClr val="tx1"/>
+                </a:solidFill>
+                <a:latin typeface="微软雅黑" panose="020B0503020204020204" pitchFamily="34" charset="-122"/>
+                <a:ea typeface="微软雅黑" panose="020B0503020204020204" pitchFamily="34" charset="-122"/>
+                <a:cs typeface="+mn-cs"/>
+              </a:defRPr>
+            </a:lvl3pPr>
+            <a:lvl4pPr marL="1344168" indent="-246888" algn="l" defTabSz="914400" rtl="0" eaLnBrk="1" latinLnBrk="0" hangingPunct="1">
+              <a:lnSpc>
+                <a:spcPct val="90000"/>
+              </a:lnSpc>
+              <a:spcBef>
+                <a:spcPts val="600"/>
+              </a:spcBef>
+              <a:buFont typeface="Arial" pitchFamily="34" charset="0"/>
+              <a:buChar char="–"/>
+              <a:defRPr sz="1800" kern="1200">
+                <a:solidFill>
+                  <a:schemeClr val="tx1"/>
+                </a:solidFill>
+                <a:latin typeface="微软雅黑" panose="020B0503020204020204" pitchFamily="34" charset="-122"/>
+                <a:ea typeface="微软雅黑" panose="020B0503020204020204" pitchFamily="34" charset="-122"/>
+                <a:cs typeface="+mn-cs"/>
+              </a:defRPr>
+            </a:lvl4pPr>
+            <a:lvl5pPr marL="1709928" indent="-246888" algn="l" defTabSz="914400" rtl="0" eaLnBrk="1" latinLnBrk="0" hangingPunct="1">
+              <a:lnSpc>
+                <a:spcPct val="90000"/>
+              </a:lnSpc>
+              <a:spcBef>
+                <a:spcPts val="600"/>
+              </a:spcBef>
+              <a:buFont typeface="Euphemia" pitchFamily="34" charset="0"/>
+              <a:buChar char="›"/>
+              <a:defRPr sz="1800" kern="1200">
+                <a:solidFill>
+                  <a:schemeClr val="tx1"/>
+                </a:solidFill>
+                <a:latin typeface="微软雅黑" panose="020B0503020204020204" pitchFamily="34" charset="-122"/>
+                <a:ea typeface="微软雅黑" panose="020B0503020204020204" pitchFamily="34" charset="-122"/>
+                <a:cs typeface="+mn-cs"/>
+              </a:defRPr>
+            </a:lvl5pPr>
+            <a:lvl6pPr marL="2075688" indent="-246888" algn="l" defTabSz="914400" rtl="0" eaLnBrk="1" latinLnBrk="0" hangingPunct="1">
+              <a:lnSpc>
+                <a:spcPct val="90000"/>
+              </a:lnSpc>
+              <a:spcBef>
+                <a:spcPts val="600"/>
+              </a:spcBef>
+              <a:buFont typeface="Euphemia" pitchFamily="34" charset="0"/>
+              <a:buChar char="–"/>
+              <a:defRPr sz="1800" kern="1200">
+                <a:solidFill>
+                  <a:schemeClr val="tx1"/>
+                </a:solidFill>
+                <a:latin typeface="+mn-lt"/>
+                <a:ea typeface="+mn-ea"/>
+                <a:cs typeface="+mn-cs"/>
+              </a:defRPr>
+            </a:lvl6pPr>
+            <a:lvl7pPr marL="2441448" indent="-246888" algn="l" defTabSz="914400" rtl="0" eaLnBrk="1" latinLnBrk="0" hangingPunct="1">
+              <a:lnSpc>
+                <a:spcPct val="90000"/>
+              </a:lnSpc>
+              <a:spcBef>
+                <a:spcPts val="600"/>
+              </a:spcBef>
+              <a:buFont typeface="Euphemia" pitchFamily="34" charset="0"/>
+              <a:buChar char="›"/>
+              <a:defRPr sz="1800" kern="1200">
+                <a:solidFill>
+                  <a:schemeClr val="tx1"/>
+                </a:solidFill>
+                <a:latin typeface="+mn-lt"/>
+                <a:ea typeface="+mn-ea"/>
+                <a:cs typeface="+mn-cs"/>
+              </a:defRPr>
+            </a:lvl7pPr>
+            <a:lvl8pPr marL="2807208" indent="-246888" algn="l" defTabSz="914400" rtl="0" eaLnBrk="1" latinLnBrk="0" hangingPunct="1">
+              <a:lnSpc>
+                <a:spcPct val="90000"/>
+              </a:lnSpc>
+              <a:spcBef>
+                <a:spcPts val="600"/>
+              </a:spcBef>
+              <a:buFont typeface="Euphemia" pitchFamily="34" charset="0"/>
+              <a:buChar char="–"/>
+              <a:defRPr sz="1800" kern="1200" baseline="0">
+                <a:solidFill>
+                  <a:schemeClr val="tx1"/>
+                </a:solidFill>
+                <a:latin typeface="+mn-lt"/>
+                <a:ea typeface="+mn-ea"/>
+                <a:cs typeface="+mn-cs"/>
+              </a:defRPr>
+            </a:lvl8pPr>
+            <a:lvl9pPr marL="3172968" indent="-246888" algn="l" defTabSz="914400" rtl="0" eaLnBrk="1" latinLnBrk="0" hangingPunct="1">
+              <a:lnSpc>
+                <a:spcPct val="90000"/>
+              </a:lnSpc>
+              <a:spcBef>
+                <a:spcPts val="600"/>
+              </a:spcBef>
+              <a:buFont typeface="Euphemia" pitchFamily="34" charset="0"/>
+              <a:buChar char="›"/>
+              <a:defRPr sz="1800" kern="1200" baseline="0">
+                <a:solidFill>
+                  <a:schemeClr val="tx1"/>
+                </a:solidFill>
+                <a:latin typeface="+mn-lt"/>
+                <a:ea typeface="+mn-ea"/>
+                <a:cs typeface="+mn-cs"/>
+              </a:defRPr>
+            </a:lvl9pPr>
+          </a:lstStyle>
+          <a:p>
+            <a:r>
+              <a:rPr lang="zh-CN" altLang="en-US">
+                <a:solidFill>
+                  <a:schemeClr val="accent4"/>
+                </a:solidFill>
+                <a:latin typeface="Arial" panose="020B0604020202020204" pitchFamily="34" charset="0"/>
+                <a:sym typeface="Arial" panose="020B0604020202020204" pitchFamily="34" charset="0"/>
+              </a:rPr>
+              <a:t>分享人：</a:t>
+            </a:r>
+            <a:r>
+              <a:rPr lang="en-US" altLang="zh-CN">
+                <a:solidFill>
+                  <a:schemeClr val="accent4"/>
+                </a:solidFill>
+                <a:latin typeface="Arial" panose="020B0604020202020204" pitchFamily="34" charset="0"/>
+                <a:sym typeface="Arial" panose="020B0604020202020204" pitchFamily="34" charset="0"/>
+              </a:rPr>
+              <a:t>Ai</a:t>
+            </a:r>
+            <a:r>
+              <a:rPr lang="zh-CN" altLang="en-US">
+                <a:solidFill>
+                  <a:schemeClr val="accent4"/>
+                </a:solidFill>
+                <a:latin typeface="Arial" panose="020B0604020202020204" pitchFamily="34" charset="0"/>
+                <a:sym typeface="Arial" panose="020B0604020202020204" pitchFamily="34" charset="0"/>
+              </a:rPr>
+              <a:t>兔兔</a:t>
+            </a:r>
+            <a:endParaRPr lang="en-US" altLang="zh-CN">
+              <a:solidFill>
+                <a:schemeClr val="accent4"/>
+              </a:solidFill>
+              <a:latin typeface="Arial" panose="020B0604020202020204" pitchFamily="34" charset="0"/>
+              <a:sym typeface="Arial" panose="020B0604020202020204" pitchFamily="34" charset="0"/>
+            </a:endParaRPr>
+          </a:p>
+          <a:p>
+            <a:r>
+              <a:rPr lang="en-US" altLang="zh-CN">
+                <a:solidFill>
+                  <a:schemeClr val="accent4"/>
+                </a:solidFill>
+                <a:latin typeface="Arial" panose="020B0604020202020204" pitchFamily="34" charset="0"/>
+                <a:sym typeface="Arial" panose="020B0604020202020204" pitchFamily="34" charset="0"/>
+              </a:rPr>
+              <a:t>Blog</a:t>
+            </a:r>
+            <a:r>
+              <a:rPr lang="zh-CN" altLang="en-US">
+                <a:solidFill>
+                  <a:schemeClr val="accent4"/>
+                </a:solidFill>
+                <a:latin typeface="Arial" panose="020B0604020202020204" pitchFamily="34" charset="0"/>
+                <a:sym typeface="Arial" panose="020B0604020202020204" pitchFamily="34" charset="0"/>
+              </a:rPr>
+              <a:t>：</a:t>
+            </a:r>
+            <a:r>
+              <a:rPr lang="en-US" altLang="zh-CN">
+                <a:hlinkClick r:id="rId2"/>
+              </a:rPr>
+              <a:t>http://sakigami-yang.me/</a:t>
+            </a:r>
+            <a:endParaRPr lang="en-US" altLang="zh-CN"/>
+          </a:p>
+          <a:p>
+            <a:r>
+              <a:rPr lang="en-US" altLang="zh-CN">
+                <a:solidFill>
+                  <a:schemeClr val="accent4"/>
+                </a:solidFill>
+                <a:latin typeface="Arial" panose="020B0604020202020204" pitchFamily="34" charset="0"/>
+                <a:sym typeface="Arial" panose="020B0604020202020204" pitchFamily="34" charset="0"/>
+              </a:rPr>
+              <a:t>Github</a:t>
+            </a:r>
+            <a:r>
+              <a:rPr lang="zh-CN" altLang="en-US">
+                <a:solidFill>
+                  <a:schemeClr val="accent4"/>
+                </a:solidFill>
+                <a:latin typeface="Arial" panose="020B0604020202020204" pitchFamily="34" charset="0"/>
+                <a:sym typeface="Arial" panose="020B0604020202020204" pitchFamily="34" charset="0"/>
+              </a:rPr>
+              <a:t>：</a:t>
+            </a:r>
+            <a:r>
+              <a:rPr lang="en-US" altLang="zh-CN">
+                <a:hlinkClick r:id="rId3"/>
+              </a:rPr>
+              <a:t>https://github.com/SakigamiYang</a:t>
+            </a:r>
+            <a:endParaRPr lang="zh-CN" altLang="en-US" dirty="0">
+              <a:solidFill>
+                <a:schemeClr val="accent4"/>
+              </a:solidFill>
+              <a:latin typeface="Arial" panose="020B0604020202020204" pitchFamily="34" charset="0"/>
+              <a:sym typeface="Arial" panose="020B0604020202020204" pitchFamily="34" charset="0"/>
+            </a:endParaRPr>
+          </a:p>
+        </p:txBody>
+      </p:sp>
+    </p:spTree>
+    <p:extLst>
+      <p:ext uri="{BB962C8B-B14F-4D97-AF65-F5344CB8AC3E}">
+        <p14:creationId xmlns:p14="http://schemas.microsoft.com/office/powerpoint/2010/main" val="206787478"/>
+      </p:ext>
+    </p:extLst>
+  </p:cSld>
+  <p:clrMapOvr>
+    <a:masterClrMapping/>
+  </p:clrMapOvr>
+  <mc:AlternateContent xmlns:mc="http://schemas.openxmlformats.org/markup-compatibility/2006" xmlns:p14="http://schemas.microsoft.com/office/powerpoint/2010/main">
+    <mc:Choice Requires="p14">
+      <p:transition spd="med" p14:dur="700">
+        <p:fade/>
+      </p:transition>
+    </mc:Choice>
+    <mc:Fallback xmlns="">
+      <p:transition spd="med">
+        <p:fade/>
+      </p:transition>
+    </mc:Fallback>
+  </mc:AlternateContent>
+</p:sld>
+</file>
+
 <file path=ppt/slides/slide3.xml><?xml version="1.0" encoding="utf-8"?>
 <p:sld xmlns:a="http://schemas.openxmlformats.org/drawingml/2006/main" xmlns:r="http://schemas.openxmlformats.org/officeDocument/2006/relationships" xmlns:p="http://schemas.openxmlformats.org/presentationml/2006/main">
   <p:cSld>
@@ -23020,8 +26138,8 @@
           </a:p>
         </p:txBody>
       </p:sp>
-      <mc:AlternateContent xmlns:mc="http://schemas.openxmlformats.org/markup-compatibility/2006">
-        <mc:Choice xmlns:a14="http://schemas.microsoft.com/office/drawing/2010/main" Requires="a14">
+      <mc:AlternateContent xmlns:mc="http://schemas.openxmlformats.org/markup-compatibility/2006" xmlns:a14="http://schemas.microsoft.com/office/drawing/2010/main">
+        <mc:Choice Requires="a14">
           <p:sp>
             <p:nvSpPr>
               <p:cNvPr id="7" name="文本框 6">
@@ -23244,7 +26362,7 @@
             </p:txBody>
           </p:sp>
         </mc:Choice>
-        <mc:Fallback>
+        <mc:Fallback xmlns="">
           <p:sp>
             <p:nvSpPr>
               <p:cNvPr id="7" name="文本框 6">
@@ -24478,8 +27596,8 @@
           </a:p>
         </p:txBody>
       </p:sp>
-      <mc:AlternateContent xmlns:mc="http://schemas.openxmlformats.org/markup-compatibility/2006">
-        <mc:Choice xmlns:a14="http://schemas.microsoft.com/office/drawing/2010/main" Requires="a14">
+      <mc:AlternateContent xmlns:mc="http://schemas.openxmlformats.org/markup-compatibility/2006" xmlns:a14="http://schemas.microsoft.com/office/drawing/2010/main">
+        <mc:Choice Requires="a14">
           <p:sp>
             <p:nvSpPr>
               <p:cNvPr id="4" name="文本框 3">
@@ -24631,7 +27749,7 @@
             </p:txBody>
           </p:sp>
         </mc:Choice>
-        <mc:Fallback>
+        <mc:Fallback xmlns="">
           <p:sp>
             <p:nvSpPr>
               <p:cNvPr id="4" name="文本框 3">
@@ -24751,13 +27869,13 @@
   <p:clrMapOvr>
     <a:masterClrMapping/>
   </p:clrMapOvr>
-  <mc:AlternateContent xmlns:mc="http://schemas.openxmlformats.org/markup-compatibility/2006">
-    <mc:Choice xmlns:p14="http://schemas.microsoft.com/office/powerpoint/2010/main" Requires="p14">
+  <mc:AlternateContent xmlns:mc="http://schemas.openxmlformats.org/markup-compatibility/2006" xmlns:p14="http://schemas.microsoft.com/office/powerpoint/2010/main">
+    <mc:Choice Requires="p14">
       <p:transition spd="med" p14:dur="700">
         <p:fade/>
       </p:transition>
     </mc:Choice>
-    <mc:Fallback>
+    <mc:Fallback xmlns="">
       <p:transition spd="med">
         <p:fade/>
       </p:transition>

</xml_diff>